<commit_message>
Added new demo file and test resources
</commit_message>
<xml_diff>
--- a/kainosSteg.pptx
+++ b/kainosSteg.pptx
@@ -1,9 +1,12 @@
 
 <file path=ppt/presentation.xml><?xml version="1.0" encoding="utf-8"?>
-<p:presentation xmlns:a="http://schemas.openxmlformats.org/drawingml/2006/main" xmlns:r="http://schemas.openxmlformats.org/officeDocument/2006/relationships" xmlns:p="http://schemas.openxmlformats.org/presentationml/2006/main" autoCompressPictures="0">
+<p:presentation xmlns:a="http://schemas.openxmlformats.org/drawingml/2006/main" xmlns:r="http://schemas.openxmlformats.org/officeDocument/2006/relationships" xmlns:p="http://schemas.openxmlformats.org/presentationml/2006/main" showSpecialPlsOnTitleSld="0" autoCompressPictures="0">
   <p:sldMasterIdLst>
     <p:sldMasterId id="2147483648" r:id="rId1"/>
   </p:sldMasterIdLst>
+  <p:notesMasterIdLst>
+    <p:notesMasterId r:id="rId14"/>
+  </p:notesMasterIdLst>
   <p:sldIdLst>
     <p:sldId id="256" r:id="rId2"/>
     <p:sldId id="259" r:id="rId3"/>
@@ -123,6 +126,355 @@
 </p:presentation>
 </file>
 
+<file path=ppt/notesMasters/notesMaster1.xml><?xml version="1.0" encoding="utf-8"?>
+<p:notesMaster xmlns:a="http://schemas.openxmlformats.org/drawingml/2006/main" xmlns:r="http://schemas.openxmlformats.org/officeDocument/2006/relationships" xmlns:p="http://schemas.openxmlformats.org/presentationml/2006/main">
+  <p:cSld>
+    <p:bg>
+      <p:bgRef idx="1001">
+        <a:schemeClr val="bg1"/>
+      </p:bgRef>
+    </p:bg>
+    <p:spTree>
+      <p:nvGrpSpPr>
+        <p:cNvPr id="1" name=""/>
+        <p:cNvGrpSpPr/>
+        <p:nvPr/>
+      </p:nvGrpSpPr>
+      <p:grpSpPr>
+        <a:xfrm>
+          <a:off x="0" y="0"/>
+          <a:ext cx="0" cy="0"/>
+          <a:chOff x="0" y="0"/>
+          <a:chExt cx="0" cy="0"/>
+        </a:xfrm>
+      </p:grpSpPr>
+      <p:sp>
+        <p:nvSpPr>
+          <p:cNvPr id="2" name="Header Placeholder 1"/>
+          <p:cNvSpPr>
+            <a:spLocks noGrp="1"/>
+          </p:cNvSpPr>
+          <p:nvPr>
+            <p:ph type="hdr" sz="quarter"/>
+          </p:nvPr>
+        </p:nvSpPr>
+        <p:spPr>
+          <a:xfrm>
+            <a:off x="0" y="0"/>
+            <a:ext cx="2971800" cy="458788"/>
+          </a:xfrm>
+          <a:prstGeom prst="rect">
+            <a:avLst/>
+          </a:prstGeom>
+        </p:spPr>
+        <p:txBody>
+          <a:bodyPr vert="horz" lIns="91440" tIns="45720" rIns="91440" bIns="45720" rtlCol="0"/>
+          <a:lstStyle>
+            <a:lvl1pPr algn="l">
+              <a:defRPr sz="1200"/>
+            </a:lvl1pPr>
+          </a:lstStyle>
+          <a:p>
+            <a:endParaRPr lang="en-US"/>
+          </a:p>
+        </p:txBody>
+      </p:sp>
+      <p:sp>
+        <p:nvSpPr>
+          <p:cNvPr id="3" name="Date Placeholder 2"/>
+          <p:cNvSpPr>
+            <a:spLocks noGrp="1"/>
+          </p:cNvSpPr>
+          <p:nvPr>
+            <p:ph type="dt" idx="1"/>
+          </p:nvPr>
+        </p:nvSpPr>
+        <p:spPr>
+          <a:xfrm>
+            <a:off x="3884613" y="0"/>
+            <a:ext cx="2971800" cy="458788"/>
+          </a:xfrm>
+          <a:prstGeom prst="rect">
+            <a:avLst/>
+          </a:prstGeom>
+        </p:spPr>
+        <p:txBody>
+          <a:bodyPr vert="horz" lIns="91440" tIns="45720" rIns="91440" bIns="45720" rtlCol="0"/>
+          <a:lstStyle>
+            <a:lvl1pPr algn="r">
+              <a:defRPr sz="1200"/>
+            </a:lvl1pPr>
+          </a:lstStyle>
+          <a:p>
+            <a:fld id="{38802A40-7C21-F942-8653-C2194C12E3D8}" type="datetimeFigureOut">
+              <a:rPr lang="en-US" smtClean="0"/>
+              <a:t>3/29/18</a:t>
+            </a:fld>
+            <a:endParaRPr lang="en-US"/>
+          </a:p>
+        </p:txBody>
+      </p:sp>
+      <p:sp>
+        <p:nvSpPr>
+          <p:cNvPr id="4" name="Slide Image Placeholder 3"/>
+          <p:cNvSpPr>
+            <a:spLocks noGrp="1" noRot="1" noChangeAspect="1"/>
+          </p:cNvSpPr>
+          <p:nvPr>
+            <p:ph type="sldImg" idx="2"/>
+          </p:nvPr>
+        </p:nvSpPr>
+        <p:spPr>
+          <a:xfrm>
+            <a:off x="685800" y="1143000"/>
+            <a:ext cx="5486400" cy="3086100"/>
+          </a:xfrm>
+          <a:prstGeom prst="rect">
+            <a:avLst/>
+          </a:prstGeom>
+          <a:noFill/>
+          <a:ln w="12700">
+            <a:solidFill>
+              <a:prstClr val="black"/>
+            </a:solidFill>
+          </a:ln>
+        </p:spPr>
+        <p:txBody>
+          <a:bodyPr vert="horz" lIns="91440" tIns="45720" rIns="91440" bIns="45720" rtlCol="0" anchor="ctr"/>
+          <a:lstStyle/>
+          <a:p>
+            <a:endParaRPr lang="en-US"/>
+          </a:p>
+        </p:txBody>
+      </p:sp>
+      <p:sp>
+        <p:nvSpPr>
+          <p:cNvPr id="5" name="Notes Placeholder 4"/>
+          <p:cNvSpPr>
+            <a:spLocks noGrp="1"/>
+          </p:cNvSpPr>
+          <p:nvPr>
+            <p:ph type="body" sz="quarter" idx="3"/>
+          </p:nvPr>
+        </p:nvSpPr>
+        <p:spPr>
+          <a:xfrm>
+            <a:off x="685800" y="4400550"/>
+            <a:ext cx="5486400" cy="3600450"/>
+          </a:xfrm>
+          <a:prstGeom prst="rect">
+            <a:avLst/>
+          </a:prstGeom>
+        </p:spPr>
+        <p:txBody>
+          <a:bodyPr vert="horz" lIns="91440" tIns="45720" rIns="91440" bIns="45720" rtlCol="0"/>
+          <a:lstStyle/>
+          <a:p>
+            <a:pPr lvl="0"/>
+            <a:r>
+              <a:rPr lang="en-US"/>
+              <a:t>Edit Master text styles</a:t>
+            </a:r>
+          </a:p>
+          <a:p>
+            <a:pPr lvl="1"/>
+            <a:r>
+              <a:rPr lang="en-US"/>
+              <a:t>Second level</a:t>
+            </a:r>
+          </a:p>
+          <a:p>
+            <a:pPr lvl="2"/>
+            <a:r>
+              <a:rPr lang="en-US"/>
+              <a:t>Third level</a:t>
+            </a:r>
+          </a:p>
+          <a:p>
+            <a:pPr lvl="3"/>
+            <a:r>
+              <a:rPr lang="en-US"/>
+              <a:t>Fourth level</a:t>
+            </a:r>
+          </a:p>
+          <a:p>
+            <a:pPr lvl="4"/>
+            <a:r>
+              <a:rPr lang="en-US"/>
+              <a:t>Fifth level</a:t>
+            </a:r>
+          </a:p>
+        </p:txBody>
+      </p:sp>
+      <p:sp>
+        <p:nvSpPr>
+          <p:cNvPr id="6" name="Footer Placeholder 5"/>
+          <p:cNvSpPr>
+            <a:spLocks noGrp="1"/>
+          </p:cNvSpPr>
+          <p:nvPr>
+            <p:ph type="ftr" sz="quarter" idx="4"/>
+          </p:nvPr>
+        </p:nvSpPr>
+        <p:spPr>
+          <a:xfrm>
+            <a:off x="0" y="8685213"/>
+            <a:ext cx="2971800" cy="458787"/>
+          </a:xfrm>
+          <a:prstGeom prst="rect">
+            <a:avLst/>
+          </a:prstGeom>
+        </p:spPr>
+        <p:txBody>
+          <a:bodyPr vert="horz" lIns="91440" tIns="45720" rIns="91440" bIns="45720" rtlCol="0" anchor="b"/>
+          <a:lstStyle>
+            <a:lvl1pPr algn="l">
+              <a:defRPr sz="1200"/>
+            </a:lvl1pPr>
+          </a:lstStyle>
+          <a:p>
+            <a:endParaRPr lang="en-US"/>
+          </a:p>
+        </p:txBody>
+      </p:sp>
+      <p:sp>
+        <p:nvSpPr>
+          <p:cNvPr id="7" name="Slide Number Placeholder 6"/>
+          <p:cNvSpPr>
+            <a:spLocks noGrp="1"/>
+          </p:cNvSpPr>
+          <p:nvPr>
+            <p:ph type="sldNum" sz="quarter" idx="5"/>
+          </p:nvPr>
+        </p:nvSpPr>
+        <p:spPr>
+          <a:xfrm>
+            <a:off x="3884613" y="8685213"/>
+            <a:ext cx="2971800" cy="458787"/>
+          </a:xfrm>
+          <a:prstGeom prst="rect">
+            <a:avLst/>
+          </a:prstGeom>
+        </p:spPr>
+        <p:txBody>
+          <a:bodyPr vert="horz" lIns="91440" tIns="45720" rIns="91440" bIns="45720" rtlCol="0" anchor="b"/>
+          <a:lstStyle>
+            <a:lvl1pPr algn="r">
+              <a:defRPr sz="1200"/>
+            </a:lvl1pPr>
+          </a:lstStyle>
+          <a:p>
+            <a:fld id="{BEC0FBBC-95C4-4E4D-954B-418FEE861FC8}" type="slidenum">
+              <a:rPr lang="en-US" smtClean="0"/>
+              <a:t>‹#›</a:t>
+            </a:fld>
+            <a:endParaRPr lang="en-US"/>
+          </a:p>
+        </p:txBody>
+      </p:sp>
+    </p:spTree>
+    <p:extLst>
+      <p:ext uri="{BB962C8B-B14F-4D97-AF65-F5344CB8AC3E}">
+        <p14:creationId xmlns:p14="http://schemas.microsoft.com/office/powerpoint/2010/main" val="240354351"/>
+      </p:ext>
+    </p:extLst>
+  </p:cSld>
+  <p:clrMap bg1="lt1" tx1="dk1" bg2="lt2" tx2="dk2" accent1="accent1" accent2="accent2" accent3="accent3" accent4="accent4" accent5="accent5" accent6="accent6" hlink="hlink" folHlink="folHlink"/>
+  <p:notesStyle>
+    <a:lvl1pPr marL="0" algn="l" defTabSz="914400" rtl="0" eaLnBrk="1" latinLnBrk="0" hangingPunct="1">
+      <a:defRPr sz="1200" kern="1200">
+        <a:solidFill>
+          <a:schemeClr val="tx1"/>
+        </a:solidFill>
+        <a:latin typeface="+mn-lt"/>
+        <a:ea typeface="+mn-ea"/>
+        <a:cs typeface="+mn-cs"/>
+      </a:defRPr>
+    </a:lvl1pPr>
+    <a:lvl2pPr marL="457200" algn="l" defTabSz="914400" rtl="0" eaLnBrk="1" latinLnBrk="0" hangingPunct="1">
+      <a:defRPr sz="1200" kern="1200">
+        <a:solidFill>
+          <a:schemeClr val="tx1"/>
+        </a:solidFill>
+        <a:latin typeface="+mn-lt"/>
+        <a:ea typeface="+mn-ea"/>
+        <a:cs typeface="+mn-cs"/>
+      </a:defRPr>
+    </a:lvl2pPr>
+    <a:lvl3pPr marL="914400" algn="l" defTabSz="914400" rtl="0" eaLnBrk="1" latinLnBrk="0" hangingPunct="1">
+      <a:defRPr sz="1200" kern="1200">
+        <a:solidFill>
+          <a:schemeClr val="tx1"/>
+        </a:solidFill>
+        <a:latin typeface="+mn-lt"/>
+        <a:ea typeface="+mn-ea"/>
+        <a:cs typeface="+mn-cs"/>
+      </a:defRPr>
+    </a:lvl3pPr>
+    <a:lvl4pPr marL="1371600" algn="l" defTabSz="914400" rtl="0" eaLnBrk="1" latinLnBrk="0" hangingPunct="1">
+      <a:defRPr sz="1200" kern="1200">
+        <a:solidFill>
+          <a:schemeClr val="tx1"/>
+        </a:solidFill>
+        <a:latin typeface="+mn-lt"/>
+        <a:ea typeface="+mn-ea"/>
+        <a:cs typeface="+mn-cs"/>
+      </a:defRPr>
+    </a:lvl4pPr>
+    <a:lvl5pPr marL="1828800" algn="l" defTabSz="914400" rtl="0" eaLnBrk="1" latinLnBrk="0" hangingPunct="1">
+      <a:defRPr sz="1200" kern="1200">
+        <a:solidFill>
+          <a:schemeClr val="tx1"/>
+        </a:solidFill>
+        <a:latin typeface="+mn-lt"/>
+        <a:ea typeface="+mn-ea"/>
+        <a:cs typeface="+mn-cs"/>
+      </a:defRPr>
+    </a:lvl5pPr>
+    <a:lvl6pPr marL="2286000" algn="l" defTabSz="914400" rtl="0" eaLnBrk="1" latinLnBrk="0" hangingPunct="1">
+      <a:defRPr sz="1200" kern="1200">
+        <a:solidFill>
+          <a:schemeClr val="tx1"/>
+        </a:solidFill>
+        <a:latin typeface="+mn-lt"/>
+        <a:ea typeface="+mn-ea"/>
+        <a:cs typeface="+mn-cs"/>
+      </a:defRPr>
+    </a:lvl6pPr>
+    <a:lvl7pPr marL="2743200" algn="l" defTabSz="914400" rtl="0" eaLnBrk="1" latinLnBrk="0" hangingPunct="1">
+      <a:defRPr sz="1200" kern="1200">
+        <a:solidFill>
+          <a:schemeClr val="tx1"/>
+        </a:solidFill>
+        <a:latin typeface="+mn-lt"/>
+        <a:ea typeface="+mn-ea"/>
+        <a:cs typeface="+mn-cs"/>
+      </a:defRPr>
+    </a:lvl7pPr>
+    <a:lvl8pPr marL="3200400" algn="l" defTabSz="914400" rtl="0" eaLnBrk="1" latinLnBrk="0" hangingPunct="1">
+      <a:defRPr sz="1200" kern="1200">
+        <a:solidFill>
+          <a:schemeClr val="tx1"/>
+        </a:solidFill>
+        <a:latin typeface="+mn-lt"/>
+        <a:ea typeface="+mn-ea"/>
+        <a:cs typeface="+mn-cs"/>
+      </a:defRPr>
+    </a:lvl8pPr>
+    <a:lvl9pPr marL="3657600" algn="l" defTabSz="914400" rtl="0" eaLnBrk="1" latinLnBrk="0" hangingPunct="1">
+      <a:defRPr sz="1200" kern="1200">
+        <a:solidFill>
+          <a:schemeClr val="tx1"/>
+        </a:solidFill>
+        <a:latin typeface="+mn-lt"/>
+        <a:ea typeface="+mn-ea"/>
+        <a:cs typeface="+mn-cs"/>
+      </a:defRPr>
+    </a:lvl9pPr>
+  </p:notesStyle>
+</p:notesMaster>
+</file>
+
 <file path=ppt/slideLayouts/slideLayout1.xml><?xml version="1.0" encoding="utf-8"?>
 <p:sldLayout xmlns:a="http://schemas.openxmlformats.org/drawingml/2006/main" xmlns:r="http://schemas.openxmlformats.org/officeDocument/2006/relationships" xmlns:p="http://schemas.openxmlformats.org/presentationml/2006/main" showMasterSp="0" type="title" preserve="1">
   <p:cSld name="Title Slide">
@@ -173,7 +525,7 @@
           <a:noFill/>
           <a:extLst>
             <a:ext uri="{909E8E84-426E-40dd-AFC4-6F175D3DCCD1}">
-              <a14:hiddenFill xmlns="" xmlns:a14="http://schemas.microsoft.com/office/drawing/2010/main">
+              <a14:hiddenFill xmlns:a14="http://schemas.microsoft.com/office/drawing/2010/main" xmlns="">
                 <a:solidFill>
                   <a:srgbClr val="FFFFFF"/>
                 </a:solidFill>
@@ -233,7 +585,7 @@
             </a:ln>
             <a:extLst>
               <a:ext uri="{91240B29-F687-4f45-9708-019B960494DF}">
-                <a14:hiddenLine xmlns="" xmlns:a14="http://schemas.microsoft.com/office/drawing/2010/main" w="9525">
+                <a14:hiddenLine xmlns:a14="http://schemas.microsoft.com/office/drawing/2010/main" xmlns="" w="9525">
                   <a:solidFill>
                     <a:srgbClr val="000000"/>
                   </a:solidFill>
@@ -323,7 +675,7 @@
             </a:ln>
             <a:extLst>
               <a:ext uri="{91240B29-F687-4f45-9708-019B960494DF}">
-                <a14:hiddenLine xmlns="" xmlns:a14="http://schemas.microsoft.com/office/drawing/2010/main" w="9525">
+                <a14:hiddenLine xmlns:a14="http://schemas.microsoft.com/office/drawing/2010/main" xmlns="" w="9525">
                   <a:solidFill>
                     <a:srgbClr val="000000"/>
                   </a:solidFill>
@@ -413,7 +765,7 @@
             </a:ln>
             <a:extLst>
               <a:ext uri="{91240B29-F687-4f45-9708-019B960494DF}">
-                <a14:hiddenLine xmlns="" xmlns:a14="http://schemas.microsoft.com/office/drawing/2010/main" w="9525">
+                <a14:hiddenLine xmlns:a14="http://schemas.microsoft.com/office/drawing/2010/main" xmlns="" w="9525">
                   <a:solidFill>
                     <a:srgbClr val="000000"/>
                   </a:solidFill>
@@ -447,7 +799,7 @@
             </a:ln>
             <a:extLst>
               <a:ext uri="{91240B29-F687-4f45-9708-019B960494DF}">
-                <a14:hiddenLine xmlns="" xmlns:a14="http://schemas.microsoft.com/office/drawing/2010/main" w="9525">
+                <a14:hiddenLine xmlns:a14="http://schemas.microsoft.com/office/drawing/2010/main" xmlns="" w="9525">
                   <a:solidFill>
                     <a:srgbClr val="000000"/>
                   </a:solidFill>
@@ -537,7 +889,7 @@
             </a:ln>
             <a:extLst>
               <a:ext uri="{91240B29-F687-4f45-9708-019B960494DF}">
-                <a14:hiddenLine xmlns="" xmlns:a14="http://schemas.microsoft.com/office/drawing/2010/main" w="9525">
+                <a14:hiddenLine xmlns:a14="http://schemas.microsoft.com/office/drawing/2010/main" xmlns="" w="9525">
                   <a:solidFill>
                     <a:srgbClr val="000000"/>
                   </a:solidFill>
@@ -599,7 +951,7 @@
             </a:ln>
             <a:extLst>
               <a:ext uri="{91240B29-F687-4f45-9708-019B960494DF}">
-                <a14:hiddenLine xmlns="" xmlns:a14="http://schemas.microsoft.com/office/drawing/2010/main" w="9525">
+                <a14:hiddenLine xmlns:a14="http://schemas.microsoft.com/office/drawing/2010/main" xmlns="" w="9525">
                   <a:solidFill>
                     <a:srgbClr val="000000"/>
                   </a:solidFill>
@@ -661,7 +1013,7 @@
             </a:ln>
             <a:extLst>
               <a:ext uri="{91240B29-F687-4f45-9708-019B960494DF}">
-                <a14:hiddenLine xmlns="" xmlns:a14="http://schemas.microsoft.com/office/drawing/2010/main" w="9525">
+                <a14:hiddenLine xmlns:a14="http://schemas.microsoft.com/office/drawing/2010/main" xmlns="" w="9525">
                   <a:solidFill>
                     <a:srgbClr val="000000"/>
                   </a:solidFill>
@@ -751,7 +1103,7 @@
             </a:ln>
             <a:extLst>
               <a:ext uri="{91240B29-F687-4f45-9708-019B960494DF}">
-                <a14:hiddenLine xmlns="" xmlns:a14="http://schemas.microsoft.com/office/drawing/2010/main" w="9525">
+                <a14:hiddenLine xmlns:a14="http://schemas.microsoft.com/office/drawing/2010/main" xmlns="" w="9525">
                   <a:solidFill>
                     <a:srgbClr val="000000"/>
                   </a:solidFill>
@@ -813,7 +1165,7 @@
             </a:ln>
             <a:extLst>
               <a:ext uri="{91240B29-F687-4f45-9708-019B960494DF}">
-                <a14:hiddenLine xmlns="" xmlns:a14="http://schemas.microsoft.com/office/drawing/2010/main" w="9525">
+                <a14:hiddenLine xmlns:a14="http://schemas.microsoft.com/office/drawing/2010/main" xmlns="" w="9525">
                   <a:solidFill>
                     <a:srgbClr val="000000"/>
                   </a:solidFill>
@@ -875,7 +1227,7 @@
             </a:ln>
             <a:extLst>
               <a:ext uri="{91240B29-F687-4f45-9708-019B960494DF}">
-                <a14:hiddenLine xmlns="" xmlns:a14="http://schemas.microsoft.com/office/drawing/2010/main" w="9525">
+                <a14:hiddenLine xmlns:a14="http://schemas.microsoft.com/office/drawing/2010/main" xmlns="" w="9525">
                   <a:solidFill>
                     <a:srgbClr val="000000"/>
                   </a:solidFill>
@@ -965,7 +1317,7 @@
             </a:ln>
             <a:extLst>
               <a:ext uri="{91240B29-F687-4f45-9708-019B960494DF}">
-                <a14:hiddenLine xmlns="" xmlns:a14="http://schemas.microsoft.com/office/drawing/2010/main" w="9525">
+                <a14:hiddenLine xmlns:a14="http://schemas.microsoft.com/office/drawing/2010/main" xmlns="" w="9525">
                   <a:solidFill>
                     <a:srgbClr val="000000"/>
                   </a:solidFill>
@@ -1055,7 +1407,7 @@
             </a:ln>
             <a:extLst>
               <a:ext uri="{91240B29-F687-4f45-9708-019B960494DF}">
-                <a14:hiddenLine xmlns="" xmlns:a14="http://schemas.microsoft.com/office/drawing/2010/main" w="9525">
+                <a14:hiddenLine xmlns:a14="http://schemas.microsoft.com/office/drawing/2010/main" xmlns="" w="9525">
                   <a:solidFill>
                     <a:srgbClr val="000000"/>
                   </a:solidFill>
@@ -1117,7 +1469,7 @@
             </a:ln>
             <a:extLst>
               <a:ext uri="{91240B29-F687-4f45-9708-019B960494DF}">
-                <a14:hiddenLine xmlns="" xmlns:a14="http://schemas.microsoft.com/office/drawing/2010/main" w="9525">
+                <a14:hiddenLine xmlns:a14="http://schemas.microsoft.com/office/drawing/2010/main" xmlns="" w="9525">
                   <a:solidFill>
                     <a:srgbClr val="000000"/>
                   </a:solidFill>
@@ -1227,7 +1579,7 @@
             </a:ln>
             <a:extLst>
               <a:ext uri="{91240B29-F687-4f45-9708-019B960494DF}">
-                <a14:hiddenLine xmlns="" xmlns:a14="http://schemas.microsoft.com/office/drawing/2010/main" w="9525">
+                <a14:hiddenLine xmlns:a14="http://schemas.microsoft.com/office/drawing/2010/main" xmlns="" w="9525">
                   <a:solidFill>
                     <a:srgbClr val="000000"/>
                   </a:solidFill>
@@ -1289,7 +1641,7 @@
             </a:ln>
             <a:extLst>
               <a:ext uri="{91240B29-F687-4f45-9708-019B960494DF}">
-                <a14:hiddenLine xmlns="" xmlns:a14="http://schemas.microsoft.com/office/drawing/2010/main" w="9525">
+                <a14:hiddenLine xmlns:a14="http://schemas.microsoft.com/office/drawing/2010/main" xmlns="" w="9525">
                   <a:solidFill>
                     <a:srgbClr val="000000"/>
                   </a:solidFill>
@@ -1379,7 +1731,7 @@
             </a:ln>
             <a:extLst>
               <a:ext uri="{91240B29-F687-4f45-9708-019B960494DF}">
-                <a14:hiddenLine xmlns="" xmlns:a14="http://schemas.microsoft.com/office/drawing/2010/main" w="9525">
+                <a14:hiddenLine xmlns:a14="http://schemas.microsoft.com/office/drawing/2010/main" xmlns="" w="9525">
                   <a:solidFill>
                     <a:srgbClr val="000000"/>
                   </a:solidFill>
@@ -1469,7 +1821,7 @@
             </a:ln>
             <a:extLst>
               <a:ext uri="{91240B29-F687-4f45-9708-019B960494DF}">
-                <a14:hiddenLine xmlns="" xmlns:a14="http://schemas.microsoft.com/office/drawing/2010/main" w="9525">
+                <a14:hiddenLine xmlns:a14="http://schemas.microsoft.com/office/drawing/2010/main" xmlns="" w="9525">
                   <a:solidFill>
                     <a:srgbClr val="000000"/>
                   </a:solidFill>
@@ -1531,7 +1883,7 @@
             </a:ln>
             <a:extLst>
               <a:ext uri="{91240B29-F687-4f45-9708-019B960494DF}">
-                <a14:hiddenLine xmlns="" xmlns:a14="http://schemas.microsoft.com/office/drawing/2010/main" w="9525">
+                <a14:hiddenLine xmlns:a14="http://schemas.microsoft.com/office/drawing/2010/main" xmlns="" w="9525">
                   <a:solidFill>
                     <a:srgbClr val="000000"/>
                   </a:solidFill>
@@ -1621,7 +1973,7 @@
             </a:ln>
             <a:extLst>
               <a:ext uri="{91240B29-F687-4f45-9708-019B960494DF}">
-                <a14:hiddenLine xmlns="" xmlns:a14="http://schemas.microsoft.com/office/drawing/2010/main" w="9525">
+                <a14:hiddenLine xmlns:a14="http://schemas.microsoft.com/office/drawing/2010/main" xmlns="" w="9525">
                   <a:solidFill>
                     <a:srgbClr val="000000"/>
                   </a:solidFill>
@@ -1711,7 +2063,7 @@
             </a:ln>
             <a:extLst>
               <a:ext uri="{91240B29-F687-4f45-9708-019B960494DF}">
-                <a14:hiddenLine xmlns="" xmlns:a14="http://schemas.microsoft.com/office/drawing/2010/main" w="9525">
+                <a14:hiddenLine xmlns:a14="http://schemas.microsoft.com/office/drawing/2010/main" xmlns="" w="9525">
                   <a:solidFill>
                     <a:srgbClr val="000000"/>
                   </a:solidFill>
@@ -1767,7 +2119,7 @@
             </a:ln>
             <a:extLst>
               <a:ext uri="{91240B29-F687-4f45-9708-019B960494DF}">
-                <a14:hiddenLine xmlns="" xmlns:a14="http://schemas.microsoft.com/office/drawing/2010/main" w="9525">
+                <a14:hiddenLine xmlns:a14="http://schemas.microsoft.com/office/drawing/2010/main" xmlns="" w="9525">
                   <a:solidFill>
                     <a:srgbClr val="000000"/>
                   </a:solidFill>
@@ -1857,7 +2209,7 @@
             </a:ln>
             <a:extLst>
               <a:ext uri="{91240B29-F687-4f45-9708-019B960494DF}">
-                <a14:hiddenLine xmlns="" xmlns:a14="http://schemas.microsoft.com/office/drawing/2010/main" w="9525">
+                <a14:hiddenLine xmlns:a14="http://schemas.microsoft.com/office/drawing/2010/main" xmlns="" w="9525">
                   <a:solidFill>
                     <a:srgbClr val="000000"/>
                   </a:solidFill>
@@ -1913,7 +2265,7 @@
             </a:ln>
             <a:extLst>
               <a:ext uri="{91240B29-F687-4f45-9708-019B960494DF}">
-                <a14:hiddenLine xmlns="" xmlns:a14="http://schemas.microsoft.com/office/drawing/2010/main" w="9525">
+                <a14:hiddenLine xmlns:a14="http://schemas.microsoft.com/office/drawing/2010/main" xmlns="" w="9525">
                   <a:solidFill>
                     <a:srgbClr val="000000"/>
                   </a:solidFill>
@@ -2003,7 +2355,7 @@
             </a:ln>
             <a:extLst>
               <a:ext uri="{91240B29-F687-4f45-9708-019B960494DF}">
-                <a14:hiddenLine xmlns="" xmlns:a14="http://schemas.microsoft.com/office/drawing/2010/main" w="9525">
+                <a14:hiddenLine xmlns:a14="http://schemas.microsoft.com/office/drawing/2010/main" xmlns="" w="9525">
                   <a:solidFill>
                     <a:srgbClr val="000000"/>
                   </a:solidFill>
@@ -2071,7 +2423,7 @@
             </a:ln>
             <a:extLst>
               <a:ext uri="{91240B29-F687-4f45-9708-019B960494DF}">
-                <a14:hiddenLine xmlns="" xmlns:a14="http://schemas.microsoft.com/office/drawing/2010/main" w="9525">
+                <a14:hiddenLine xmlns:a14="http://schemas.microsoft.com/office/drawing/2010/main" xmlns="" w="9525">
                   <a:solidFill>
                     <a:srgbClr val="000000"/>
                   </a:solidFill>
@@ -2161,7 +2513,7 @@
             </a:ln>
             <a:extLst>
               <a:ext uri="{91240B29-F687-4f45-9708-019B960494DF}">
-                <a14:hiddenLine xmlns="" xmlns:a14="http://schemas.microsoft.com/office/drawing/2010/main" w="9525">
+                <a14:hiddenLine xmlns:a14="http://schemas.microsoft.com/office/drawing/2010/main" xmlns="" w="9525">
                   <a:solidFill>
                     <a:srgbClr val="000000"/>
                   </a:solidFill>
@@ -2229,7 +2581,7 @@
             </a:ln>
             <a:extLst>
               <a:ext uri="{91240B29-F687-4f45-9708-019B960494DF}">
-                <a14:hiddenLine xmlns="" xmlns:a14="http://schemas.microsoft.com/office/drawing/2010/main" w="9525">
+                <a14:hiddenLine xmlns:a14="http://schemas.microsoft.com/office/drawing/2010/main" xmlns="" w="9525">
                   <a:solidFill>
                     <a:srgbClr val="000000"/>
                   </a:solidFill>
@@ -2319,7 +2671,7 @@
             </a:ln>
             <a:extLst>
               <a:ext uri="{91240B29-F687-4f45-9708-019B960494DF}">
-                <a14:hiddenLine xmlns="" xmlns:a14="http://schemas.microsoft.com/office/drawing/2010/main" w="9525">
+                <a14:hiddenLine xmlns:a14="http://schemas.microsoft.com/office/drawing/2010/main" xmlns="" w="9525">
                   <a:solidFill>
                     <a:srgbClr val="000000"/>
                   </a:solidFill>
@@ -2353,7 +2705,7 @@
             </a:ln>
             <a:extLst>
               <a:ext uri="{91240B29-F687-4f45-9708-019B960494DF}">
-                <a14:hiddenLine xmlns="" xmlns:a14="http://schemas.microsoft.com/office/drawing/2010/main" w="9525">
+                <a14:hiddenLine xmlns:a14="http://schemas.microsoft.com/office/drawing/2010/main" xmlns="" w="9525">
                   <a:solidFill>
                     <a:srgbClr val="000000"/>
                   </a:solidFill>
@@ -2443,7 +2795,7 @@
             </a:ln>
             <a:extLst>
               <a:ext uri="{91240B29-F687-4f45-9708-019B960494DF}">
-                <a14:hiddenLine xmlns="" xmlns:a14="http://schemas.microsoft.com/office/drawing/2010/main" w="9525">
+                <a14:hiddenLine xmlns:a14="http://schemas.microsoft.com/office/drawing/2010/main" xmlns="" w="9525">
                   <a:solidFill>
                     <a:srgbClr val="000000"/>
                   </a:solidFill>
@@ -2505,7 +2857,7 @@
             </a:ln>
             <a:extLst>
               <a:ext uri="{91240B29-F687-4f45-9708-019B960494DF}">
-                <a14:hiddenLine xmlns="" xmlns:a14="http://schemas.microsoft.com/office/drawing/2010/main" w="9525">
+                <a14:hiddenLine xmlns:a14="http://schemas.microsoft.com/office/drawing/2010/main" xmlns="" w="9525">
                   <a:solidFill>
                     <a:srgbClr val="000000"/>
                   </a:solidFill>
@@ -2567,7 +2919,7 @@
             </a:ln>
             <a:extLst>
               <a:ext uri="{91240B29-F687-4f45-9708-019B960494DF}">
-                <a14:hiddenLine xmlns="" xmlns:a14="http://schemas.microsoft.com/office/drawing/2010/main" w="9525">
+                <a14:hiddenLine xmlns:a14="http://schemas.microsoft.com/office/drawing/2010/main" xmlns="" w="9525">
                   <a:solidFill>
                     <a:srgbClr val="000000"/>
                   </a:solidFill>
@@ -2657,7 +3009,7 @@
             </a:ln>
             <a:extLst>
               <a:ext uri="{91240B29-F687-4f45-9708-019B960494DF}">
-                <a14:hiddenLine xmlns="" xmlns:a14="http://schemas.microsoft.com/office/drawing/2010/main" w="9525">
+                <a14:hiddenLine xmlns:a14="http://schemas.microsoft.com/office/drawing/2010/main" xmlns="" w="9525">
                   <a:solidFill>
                     <a:srgbClr val="000000"/>
                   </a:solidFill>
@@ -2725,7 +3077,7 @@
             </a:ln>
             <a:extLst>
               <a:ext uri="{91240B29-F687-4f45-9708-019B960494DF}">
-                <a14:hiddenLine xmlns="" xmlns:a14="http://schemas.microsoft.com/office/drawing/2010/main" w="9525">
+                <a14:hiddenLine xmlns:a14="http://schemas.microsoft.com/office/drawing/2010/main" xmlns="" w="9525">
                   <a:solidFill>
                     <a:srgbClr val="000000"/>
                   </a:solidFill>
@@ -2787,7 +3139,7 @@
             </a:ln>
             <a:extLst>
               <a:ext uri="{91240B29-F687-4f45-9708-019B960494DF}">
-                <a14:hiddenLine xmlns="" xmlns:a14="http://schemas.microsoft.com/office/drawing/2010/main" w="9525">
+                <a14:hiddenLine xmlns:a14="http://schemas.microsoft.com/office/drawing/2010/main" xmlns="" w="9525">
                   <a:solidFill>
                     <a:srgbClr val="000000"/>
                   </a:solidFill>
@@ -2877,7 +3229,7 @@
             </a:ln>
             <a:extLst>
               <a:ext uri="{91240B29-F687-4f45-9708-019B960494DF}">
-                <a14:hiddenLine xmlns="" xmlns:a14="http://schemas.microsoft.com/office/drawing/2010/main" w="9525">
+                <a14:hiddenLine xmlns:a14="http://schemas.microsoft.com/office/drawing/2010/main" xmlns="" w="9525">
                   <a:solidFill>
                     <a:srgbClr val="000000"/>
                   </a:solidFill>
@@ -2939,7 +3291,7 @@
             </a:ln>
             <a:extLst>
               <a:ext uri="{91240B29-F687-4f45-9708-019B960494DF}">
-                <a14:hiddenLine xmlns="" xmlns:a14="http://schemas.microsoft.com/office/drawing/2010/main" w="9525">
+                <a14:hiddenLine xmlns:a14="http://schemas.microsoft.com/office/drawing/2010/main" xmlns="" w="9525">
                   <a:solidFill>
                     <a:srgbClr val="000000"/>
                   </a:solidFill>
@@ -3029,7 +3381,7 @@
             </a:ln>
             <a:extLst>
               <a:ext uri="{91240B29-F687-4f45-9708-019B960494DF}">
-                <a14:hiddenLine xmlns="" xmlns:a14="http://schemas.microsoft.com/office/drawing/2010/main" w="9525">
+                <a14:hiddenLine xmlns:a14="http://schemas.microsoft.com/office/drawing/2010/main" xmlns="" w="9525">
                   <a:solidFill>
                     <a:srgbClr val="000000"/>
                   </a:solidFill>
@@ -3091,7 +3443,7 @@
             </a:ln>
             <a:extLst>
               <a:ext uri="{91240B29-F687-4f45-9708-019B960494DF}">
-                <a14:hiddenLine xmlns="" xmlns:a14="http://schemas.microsoft.com/office/drawing/2010/main" w="9525">
+                <a14:hiddenLine xmlns:a14="http://schemas.microsoft.com/office/drawing/2010/main" xmlns="" w="9525">
                   <a:solidFill>
                     <a:srgbClr val="000000"/>
                   </a:solidFill>
@@ -3181,7 +3533,7 @@
             </a:ln>
             <a:extLst>
               <a:ext uri="{91240B29-F687-4f45-9708-019B960494DF}">
-                <a14:hiddenLine xmlns="" xmlns:a14="http://schemas.microsoft.com/office/drawing/2010/main" w="9525">
+                <a14:hiddenLine xmlns:a14="http://schemas.microsoft.com/office/drawing/2010/main" xmlns="" w="9525">
                   <a:solidFill>
                     <a:srgbClr val="000000"/>
                   </a:solidFill>
@@ -3215,7 +3567,7 @@
             </a:ln>
             <a:extLst>
               <a:ext uri="{91240B29-F687-4f45-9708-019B960494DF}">
-                <a14:hiddenLine xmlns="" xmlns:a14="http://schemas.microsoft.com/office/drawing/2010/main" w="9525">
+                <a14:hiddenLine xmlns:a14="http://schemas.microsoft.com/office/drawing/2010/main" xmlns="" w="9525">
                   <a:solidFill>
                     <a:srgbClr val="000000"/>
                   </a:solidFill>
@@ -3280,7 +3632,7 @@
             </a:ln>
             <a:extLst>
               <a:ext uri="{91240B29-F687-4f45-9708-019B960494DF}">
-                <a14:hiddenLine xmlns="" xmlns:a14="http://schemas.microsoft.com/office/drawing/2010/main" w="9525">
+                <a14:hiddenLine xmlns:a14="http://schemas.microsoft.com/office/drawing/2010/main" xmlns="" w="9525">
                   <a:solidFill>
                     <a:srgbClr val="000000"/>
                   </a:solidFill>
@@ -3370,7 +3722,7 @@
             </a:ln>
             <a:extLst>
               <a:ext uri="{91240B29-F687-4f45-9708-019B960494DF}">
-                <a14:hiddenLine xmlns="" xmlns:a14="http://schemas.microsoft.com/office/drawing/2010/main" w="9525">
+                <a14:hiddenLine xmlns:a14="http://schemas.microsoft.com/office/drawing/2010/main" xmlns="" w="9525">
                   <a:solidFill>
                     <a:srgbClr val="000000"/>
                   </a:solidFill>
@@ -3432,7 +3784,7 @@
             </a:ln>
             <a:extLst>
               <a:ext uri="{91240B29-F687-4f45-9708-019B960494DF}">
-                <a14:hiddenLine xmlns="" xmlns:a14="http://schemas.microsoft.com/office/drawing/2010/main" w="9525">
+                <a14:hiddenLine xmlns:a14="http://schemas.microsoft.com/office/drawing/2010/main" xmlns="" w="9525">
                   <a:solidFill>
                     <a:srgbClr val="000000"/>
                   </a:solidFill>
@@ -3522,7 +3874,7 @@
             </a:ln>
             <a:extLst>
               <a:ext uri="{91240B29-F687-4f45-9708-019B960494DF}">
-                <a14:hiddenLine xmlns="" xmlns:a14="http://schemas.microsoft.com/office/drawing/2010/main" w="9525">
+                <a14:hiddenLine xmlns:a14="http://schemas.microsoft.com/office/drawing/2010/main" xmlns="" w="9525">
                   <a:solidFill>
                     <a:srgbClr val="000000"/>
                   </a:solidFill>
@@ -3612,7 +3964,7 @@
             </a:ln>
             <a:extLst>
               <a:ext uri="{91240B29-F687-4f45-9708-019B960494DF}">
-                <a14:hiddenLine xmlns="" xmlns:a14="http://schemas.microsoft.com/office/drawing/2010/main" w="9525">
+                <a14:hiddenLine xmlns:a14="http://schemas.microsoft.com/office/drawing/2010/main" xmlns="" w="9525">
                   <a:solidFill>
                     <a:srgbClr val="000000"/>
                   </a:solidFill>
@@ -3677,7 +4029,7 @@
             </a:ln>
             <a:extLst>
               <a:ext uri="{91240B29-F687-4f45-9708-019B960494DF}">
-                <a14:hiddenLine xmlns="" xmlns:a14="http://schemas.microsoft.com/office/drawing/2010/main" w="9525">
+                <a14:hiddenLine xmlns:a14="http://schemas.microsoft.com/office/drawing/2010/main" xmlns="" w="9525">
                   <a:solidFill>
                     <a:srgbClr val="000000"/>
                   </a:solidFill>
@@ -3739,7 +4091,7 @@
             </a:ln>
             <a:extLst>
               <a:ext uri="{91240B29-F687-4f45-9708-019B960494DF}">
-                <a14:hiddenLine xmlns="" xmlns:a14="http://schemas.microsoft.com/office/drawing/2010/main" w="9525">
+                <a14:hiddenLine xmlns:a14="http://schemas.microsoft.com/office/drawing/2010/main" xmlns="" w="9525">
                   <a:solidFill>
                     <a:srgbClr val="000000"/>
                   </a:solidFill>
@@ -3829,7 +4181,7 @@
             </a:ln>
             <a:extLst>
               <a:ext uri="{91240B29-F687-4f45-9708-019B960494DF}">
-                <a14:hiddenLine xmlns="" xmlns:a14="http://schemas.microsoft.com/office/drawing/2010/main" w="9525">
+                <a14:hiddenLine xmlns:a14="http://schemas.microsoft.com/office/drawing/2010/main" xmlns="" w="9525">
                   <a:solidFill>
                     <a:srgbClr val="000000"/>
                   </a:solidFill>
@@ -3919,7 +4271,7 @@
             </a:ln>
             <a:extLst>
               <a:ext uri="{91240B29-F687-4f45-9708-019B960494DF}">
-                <a14:hiddenLine xmlns="" xmlns:a14="http://schemas.microsoft.com/office/drawing/2010/main" w="9525">
+                <a14:hiddenLine xmlns:a14="http://schemas.microsoft.com/office/drawing/2010/main" xmlns="" w="9525">
                   <a:solidFill>
                     <a:srgbClr val="000000"/>
                   </a:solidFill>
@@ -3981,7 +4333,7 @@
             </a:ln>
             <a:extLst>
               <a:ext uri="{91240B29-F687-4f45-9708-019B960494DF}">
-                <a14:hiddenLine xmlns="" xmlns:a14="http://schemas.microsoft.com/office/drawing/2010/main" w="9525">
+                <a14:hiddenLine xmlns:a14="http://schemas.microsoft.com/office/drawing/2010/main" xmlns="" w="9525">
                   <a:solidFill>
                     <a:srgbClr val="000000"/>
                   </a:solidFill>
@@ -4101,7 +4453,7 @@
             </a:ln>
             <a:extLst>
               <a:ext uri="{91240B29-F687-4f45-9708-019B960494DF}">
-                <a14:hiddenLine xmlns="" xmlns:a14="http://schemas.microsoft.com/office/drawing/2010/main" w="9525">
+                <a14:hiddenLine xmlns:a14="http://schemas.microsoft.com/office/drawing/2010/main" xmlns="" w="9525">
                   <a:solidFill>
                     <a:srgbClr val="000000"/>
                   </a:solidFill>
@@ -4169,7 +4521,7 @@
             </a:ln>
             <a:extLst>
               <a:ext uri="{91240B29-F687-4f45-9708-019B960494DF}">
-                <a14:hiddenLine xmlns="" xmlns:a14="http://schemas.microsoft.com/office/drawing/2010/main" w="9525">
+                <a14:hiddenLine xmlns:a14="http://schemas.microsoft.com/office/drawing/2010/main" xmlns="" w="9525">
                   <a:solidFill>
                     <a:srgbClr val="000000"/>
                   </a:solidFill>
@@ -4259,7 +4611,7 @@
             </a:ln>
             <a:extLst>
               <a:ext uri="{91240B29-F687-4f45-9708-019B960494DF}">
-                <a14:hiddenLine xmlns="" xmlns:a14="http://schemas.microsoft.com/office/drawing/2010/main" w="9525">
+                <a14:hiddenLine xmlns:a14="http://schemas.microsoft.com/office/drawing/2010/main" xmlns="" w="9525">
                   <a:solidFill>
                     <a:srgbClr val="000000"/>
                   </a:solidFill>
@@ -4397,9 +4749,9 @@
           <a:bodyPr/>
           <a:lstStyle/>
           <a:p>
-            <a:fld id="{48A87A34-81AB-432B-8DAE-1953F412C126}" type="datetimeFigureOut">
-              <a:rPr lang="en-US" dirty="0"/>
-              <a:t>3/28/18</a:t>
+            <a:fld id="{86E7910F-3943-7D40-915C-A295276C9DFD}" type="datetime1">
+              <a:rPr lang="en-GB" smtClean="0"/>
+              <a:t>29/03/2018</a:t>
             </a:fld>
             <a:endParaRPr lang="en-US" dirty="0"/>
           </a:p>
@@ -4659,9 +5011,9 @@
           <a:bodyPr/>
           <a:lstStyle/>
           <a:p>
-            <a:fld id="{48A87A34-81AB-432B-8DAE-1953F412C126}" type="datetimeFigureOut">
-              <a:rPr lang="en-US" dirty="0"/>
-              <a:t>3/28/18</a:t>
+            <a:fld id="{A5E6CFB9-DDDE-CA40-8EDA-4F2FCEFDF60B}" type="datetime1">
+              <a:rPr lang="en-GB" smtClean="0"/>
+              <a:t>29/03/2018</a:t>
             </a:fld>
             <a:endParaRPr lang="en-US" dirty="0"/>
           </a:p>
@@ -4850,9 +5202,9 @@
           <a:bodyPr/>
           <a:lstStyle/>
           <a:p>
-            <a:fld id="{48A87A34-81AB-432B-8DAE-1953F412C126}" type="datetimeFigureOut">
-              <a:rPr lang="en-US" dirty="0"/>
-              <a:t>3/28/18</a:t>
+            <a:fld id="{A83B39AF-B7BC-1643-A489-1576635FCAE0}" type="datetime1">
+              <a:rPr lang="en-GB" smtClean="0"/>
+              <a:t>29/03/2018</a:t>
             </a:fld>
             <a:endParaRPr lang="en-US" dirty="0"/>
           </a:p>
@@ -5108,9 +5460,9 @@
           <a:bodyPr/>
           <a:lstStyle/>
           <a:p>
-            <a:fld id="{48A87A34-81AB-432B-8DAE-1953F412C126}" type="datetimeFigureOut">
-              <a:rPr lang="en-US" dirty="0"/>
-              <a:t>3/28/18</a:t>
+            <a:fld id="{3A5835CB-C976-C246-9208-E48792322CC0}" type="datetime1">
+              <a:rPr lang="en-GB" smtClean="0"/>
+              <a:t>29/03/2018</a:t>
             </a:fld>
             <a:endParaRPr lang="en-US" dirty="0"/>
           </a:p>
@@ -5537,9 +5889,9 @@
           <a:bodyPr/>
           <a:lstStyle/>
           <a:p>
-            <a:fld id="{48A87A34-81AB-432B-8DAE-1953F412C126}" type="datetimeFigureOut">
-              <a:rPr lang="en-US" dirty="0"/>
-              <a:t>3/28/18</a:t>
+            <a:fld id="{91DAB050-6DF7-E840-8452-D7DC0CFB2A9A}" type="datetime1">
+              <a:rPr lang="en-GB" smtClean="0"/>
+              <a:t>29/03/2018</a:t>
             </a:fld>
             <a:endParaRPr lang="en-US" dirty="0"/>
           </a:p>
@@ -6078,9 +6430,9 @@
           <a:bodyPr/>
           <a:lstStyle/>
           <a:p>
-            <a:fld id="{48A87A34-81AB-432B-8DAE-1953F412C126}" type="datetimeFigureOut">
-              <a:rPr lang="en-US" dirty="0"/>
-              <a:t>3/28/18</a:t>
+            <a:fld id="{695D80C4-22B4-DB48-B491-3F3CB7EF3BCA}" type="datetime1">
+              <a:rPr lang="en-GB" smtClean="0"/>
+              <a:t>29/03/2018</a:t>
             </a:fld>
             <a:endParaRPr lang="en-US" dirty="0"/>
           </a:p>
@@ -6793,9 +7145,9 @@
           <a:bodyPr/>
           <a:lstStyle/>
           <a:p>
-            <a:fld id="{48A87A34-81AB-432B-8DAE-1953F412C126}" type="datetimeFigureOut">
-              <a:rPr lang="en-US" dirty="0"/>
-              <a:t>3/28/18</a:t>
+            <a:fld id="{47CA9D41-C468-4749-A818-268C04CE0FC0}" type="datetime1">
+              <a:rPr lang="en-GB" smtClean="0"/>
+              <a:t>29/03/2018</a:t>
             </a:fld>
             <a:endParaRPr lang="en-US" dirty="0"/>
           </a:p>
@@ -6958,9 +7310,9 @@
           <a:bodyPr/>
           <a:lstStyle/>
           <a:p>
-            <a:fld id="{48A87A34-81AB-432B-8DAE-1953F412C126}" type="datetimeFigureOut">
-              <a:rPr lang="en-US" dirty="0"/>
-              <a:t>3/28/18</a:t>
+            <a:fld id="{E2E15665-3782-0445-AE96-9A3127954B04}" type="datetime1">
+              <a:rPr lang="en-GB" smtClean="0"/>
+              <a:t>29/03/2018</a:t>
             </a:fld>
             <a:endParaRPr lang="en-US" dirty="0"/>
           </a:p>
@@ -7133,9 +7485,9 @@
           <a:bodyPr/>
           <a:lstStyle/>
           <a:p>
-            <a:fld id="{48A87A34-81AB-432B-8DAE-1953F412C126}" type="datetimeFigureOut">
-              <a:rPr lang="en-US" dirty="0"/>
-              <a:t>3/28/18</a:t>
+            <a:fld id="{EAC26E2D-46E4-154A-A098-A7B1A5F853D4}" type="datetime1">
+              <a:rPr lang="en-GB" smtClean="0"/>
+              <a:t>29/03/2018</a:t>
             </a:fld>
             <a:endParaRPr lang="en-US" dirty="0"/>
           </a:p>
@@ -7298,9 +7650,9 @@
           <a:bodyPr/>
           <a:lstStyle/>
           <a:p>
-            <a:fld id="{48A87A34-81AB-432B-8DAE-1953F412C126}" type="datetimeFigureOut">
-              <a:rPr lang="en-US" dirty="0"/>
-              <a:t>3/28/18</a:t>
+            <a:fld id="{F701AC8C-1FD3-E94E-B603-E87B455A19A6}" type="datetime1">
+              <a:rPr lang="en-GB" smtClean="0"/>
+              <a:t>29/03/2018</a:t>
             </a:fld>
             <a:endParaRPr lang="en-US" dirty="0"/>
           </a:p>
@@ -7543,9 +7895,9 @@
           <a:bodyPr/>
           <a:lstStyle/>
           <a:p>
-            <a:fld id="{48A87A34-81AB-432B-8DAE-1953F412C126}" type="datetimeFigureOut">
-              <a:rPr lang="en-US" dirty="0"/>
-              <a:t>3/28/18</a:t>
+            <a:fld id="{D3EAC69F-01BE-3341-A835-055998B1C7B8}" type="datetime1">
+              <a:rPr lang="en-GB" smtClean="0"/>
+              <a:t>29/03/2018</a:t>
             </a:fld>
             <a:endParaRPr lang="en-US" dirty="0"/>
           </a:p>
@@ -7770,9 +8122,9 @@
           <a:bodyPr/>
           <a:lstStyle/>
           <a:p>
-            <a:fld id="{48A87A34-81AB-432B-8DAE-1953F412C126}" type="datetimeFigureOut">
-              <a:rPr lang="en-US" dirty="0"/>
-              <a:t>3/28/18</a:t>
+            <a:fld id="{5919416B-685F-AF47-9274-EB47410CDBC6}" type="datetime1">
+              <a:rPr lang="en-GB" smtClean="0"/>
+              <a:t>29/03/2018</a:t>
             </a:fld>
             <a:endParaRPr lang="en-US" dirty="0"/>
           </a:p>
@@ -8146,9 +8498,9 @@
           <a:bodyPr/>
           <a:lstStyle/>
           <a:p>
-            <a:fld id="{48A87A34-81AB-432B-8DAE-1953F412C126}" type="datetimeFigureOut">
-              <a:rPr lang="en-US" dirty="0"/>
-              <a:t>3/28/18</a:t>
+            <a:fld id="{A90CDC08-C1DB-8545-BAE6-529E24CF8925}" type="datetime1">
+              <a:rPr lang="en-GB" smtClean="0"/>
+              <a:t>29/03/2018</a:t>
             </a:fld>
             <a:endParaRPr lang="en-US" dirty="0"/>
           </a:p>
@@ -8259,9 +8611,9 @@
           <a:bodyPr/>
           <a:lstStyle/>
           <a:p>
-            <a:fld id="{48A87A34-81AB-432B-8DAE-1953F412C126}" type="datetimeFigureOut">
-              <a:rPr lang="en-US" dirty="0"/>
-              <a:t>3/28/18</a:t>
+            <a:fld id="{D116BA6D-183D-294A-86CD-5BDCC5DA65D3}" type="datetime1">
+              <a:rPr lang="en-GB" smtClean="0"/>
+              <a:t>29/03/2018</a:t>
             </a:fld>
             <a:endParaRPr lang="en-US" dirty="0"/>
           </a:p>
@@ -8349,9 +8701,9 @@
           <a:bodyPr/>
           <a:lstStyle/>
           <a:p>
-            <a:fld id="{48A87A34-81AB-432B-8DAE-1953F412C126}" type="datetimeFigureOut">
-              <a:rPr lang="en-US" dirty="0"/>
-              <a:t>3/28/18</a:t>
+            <a:fld id="{36CEEC03-456A-E04A-9BD8-79892E3FF11E}" type="datetime1">
+              <a:rPr lang="en-GB" smtClean="0"/>
+              <a:t>29/03/2018</a:t>
             </a:fld>
             <a:endParaRPr lang="en-US" dirty="0"/>
           </a:p>
@@ -8593,9 +8945,9 @@
           <a:bodyPr/>
           <a:lstStyle/>
           <a:p>
-            <a:fld id="{48A87A34-81AB-432B-8DAE-1953F412C126}" type="datetimeFigureOut">
-              <a:rPr lang="en-US" dirty="0"/>
-              <a:t>3/28/18</a:t>
+            <a:fld id="{4BF09FB1-1CDB-4E4C-B9F3-B01C507F6B83}" type="datetime1">
+              <a:rPr lang="en-GB" smtClean="0"/>
+              <a:t>29/03/2018</a:t>
             </a:fld>
             <a:endParaRPr lang="en-US" dirty="0"/>
           </a:p>
@@ -8868,9 +9220,9 @@
           <a:bodyPr/>
           <a:lstStyle/>
           <a:p>
-            <a:fld id="{48A87A34-81AB-432B-8DAE-1953F412C126}" type="datetimeFigureOut">
-              <a:rPr lang="en-US" dirty="0"/>
-              <a:t>3/28/18</a:t>
+            <a:fld id="{EAB5E29B-7ECA-F941-90B5-CE1A4EBDA50B}" type="datetime1">
+              <a:rPr lang="en-GB" smtClean="0"/>
+              <a:t>29/03/2018</a:t>
             </a:fld>
             <a:endParaRPr lang="en-US" dirty="0"/>
           </a:p>
@@ -8981,7 +9333,7 @@
           <a:noFill/>
           <a:extLst>
             <a:ext uri="{909E8E84-426E-40dd-AFC4-6F175D3DCCD1}">
-              <a14:hiddenFill xmlns="" xmlns:a14="http://schemas.microsoft.com/office/drawing/2010/main">
+              <a14:hiddenFill xmlns:a14="http://schemas.microsoft.com/office/drawing/2010/main" xmlns="">
                 <a:solidFill>
                   <a:srgbClr val="FFFFFF"/>
                 </a:solidFill>
@@ -9055,7 +9407,7 @@
               </a:ln>
               <a:extLst>
                 <a:ext uri="{91240B29-F687-4f45-9708-019B960494DF}">
-                  <a14:hiddenLine xmlns="" xmlns:a14="http://schemas.microsoft.com/office/drawing/2010/main" w="9525">
+                  <a14:hiddenLine xmlns:a14="http://schemas.microsoft.com/office/drawing/2010/main" xmlns="" w="9525">
                     <a:solidFill>
                       <a:srgbClr val="000000"/>
                     </a:solidFill>
@@ -9145,7 +9497,7 @@
               </a:ln>
               <a:extLst>
                 <a:ext uri="{91240B29-F687-4f45-9708-019B960494DF}">
-                  <a14:hiddenLine xmlns="" xmlns:a14="http://schemas.microsoft.com/office/drawing/2010/main" w="9525">
+                  <a14:hiddenLine xmlns:a14="http://schemas.microsoft.com/office/drawing/2010/main" xmlns="" w="9525">
                     <a:solidFill>
                       <a:srgbClr val="000000"/>
                     </a:solidFill>
@@ -9235,7 +9587,7 @@
               </a:ln>
               <a:extLst>
                 <a:ext uri="{91240B29-F687-4f45-9708-019B960494DF}">
-                  <a14:hiddenLine xmlns="" xmlns:a14="http://schemas.microsoft.com/office/drawing/2010/main" w="9525">
+                  <a14:hiddenLine xmlns:a14="http://schemas.microsoft.com/office/drawing/2010/main" xmlns="" w="9525">
                     <a:solidFill>
                       <a:srgbClr val="000000"/>
                     </a:solidFill>
@@ -9297,7 +9649,7 @@
               </a:ln>
               <a:extLst>
                 <a:ext uri="{91240B29-F687-4f45-9708-019B960494DF}">
-                  <a14:hiddenLine xmlns="" xmlns:a14="http://schemas.microsoft.com/office/drawing/2010/main" w="9525">
+                  <a14:hiddenLine xmlns:a14="http://schemas.microsoft.com/office/drawing/2010/main" xmlns="" w="9525">
                     <a:solidFill>
                       <a:srgbClr val="000000"/>
                     </a:solidFill>
@@ -9387,7 +9739,7 @@
               </a:ln>
               <a:extLst>
                 <a:ext uri="{91240B29-F687-4f45-9708-019B960494DF}">
-                  <a14:hiddenLine xmlns="" xmlns:a14="http://schemas.microsoft.com/office/drawing/2010/main" w="9525">
+                  <a14:hiddenLine xmlns:a14="http://schemas.microsoft.com/office/drawing/2010/main" xmlns="" w="9525">
                     <a:solidFill>
                       <a:srgbClr val="000000"/>
                     </a:solidFill>
@@ -9449,7 +9801,7 @@
               </a:ln>
               <a:extLst>
                 <a:ext uri="{91240B29-F687-4f45-9708-019B960494DF}">
-                  <a14:hiddenLine xmlns="" xmlns:a14="http://schemas.microsoft.com/office/drawing/2010/main" w="9525">
+                  <a14:hiddenLine xmlns:a14="http://schemas.microsoft.com/office/drawing/2010/main" xmlns="" w="9525">
                     <a:solidFill>
                       <a:srgbClr val="000000"/>
                     </a:solidFill>
@@ -9511,7 +9863,7 @@
               </a:ln>
               <a:extLst>
                 <a:ext uri="{91240B29-F687-4f45-9708-019B960494DF}">
-                  <a14:hiddenLine xmlns="" xmlns:a14="http://schemas.microsoft.com/office/drawing/2010/main" w="9525">
+                  <a14:hiddenLine xmlns:a14="http://schemas.microsoft.com/office/drawing/2010/main" xmlns="" w="9525">
                     <a:solidFill>
                       <a:srgbClr val="000000"/>
                     </a:solidFill>
@@ -9601,7 +9953,7 @@
               </a:ln>
               <a:extLst>
                 <a:ext uri="{91240B29-F687-4f45-9708-019B960494DF}">
-                  <a14:hiddenLine xmlns="" xmlns:a14="http://schemas.microsoft.com/office/drawing/2010/main" w="9525">
+                  <a14:hiddenLine xmlns:a14="http://schemas.microsoft.com/office/drawing/2010/main" xmlns="" w="9525">
                     <a:solidFill>
                       <a:srgbClr val="000000"/>
                     </a:solidFill>
@@ -9691,7 +10043,7 @@
               </a:ln>
               <a:extLst>
                 <a:ext uri="{91240B29-F687-4f45-9708-019B960494DF}">
-                  <a14:hiddenLine xmlns="" xmlns:a14="http://schemas.microsoft.com/office/drawing/2010/main" w="9525">
+                  <a14:hiddenLine xmlns:a14="http://schemas.microsoft.com/office/drawing/2010/main" xmlns="" w="9525">
                     <a:solidFill>
                       <a:srgbClr val="000000"/>
                     </a:solidFill>
@@ -9753,7 +10105,7 @@
               </a:ln>
               <a:extLst>
                 <a:ext uri="{91240B29-F687-4f45-9708-019B960494DF}">
-                  <a14:hiddenLine xmlns="" xmlns:a14="http://schemas.microsoft.com/office/drawing/2010/main" w="9525">
+                  <a14:hiddenLine xmlns:a14="http://schemas.microsoft.com/office/drawing/2010/main" xmlns="" w="9525">
                     <a:solidFill>
                       <a:srgbClr val="000000"/>
                     </a:solidFill>
@@ -9863,7 +10215,7 @@
               </a:ln>
               <a:extLst>
                 <a:ext uri="{91240B29-F687-4f45-9708-019B960494DF}">
-                  <a14:hiddenLine xmlns="" xmlns:a14="http://schemas.microsoft.com/office/drawing/2010/main" w="9525">
+                  <a14:hiddenLine xmlns:a14="http://schemas.microsoft.com/office/drawing/2010/main" xmlns="" w="9525">
                     <a:solidFill>
                       <a:srgbClr val="000000"/>
                     </a:solidFill>
@@ -9947,7 +10299,7 @@
               </a:ln>
               <a:extLst>
                 <a:ext uri="{91240B29-F687-4f45-9708-019B960494DF}">
-                  <a14:hiddenLine xmlns="" xmlns:a14="http://schemas.microsoft.com/office/drawing/2010/main" w="9525">
+                  <a14:hiddenLine xmlns:a14="http://schemas.microsoft.com/office/drawing/2010/main" xmlns="" w="9525">
                     <a:solidFill>
                       <a:srgbClr val="000000"/>
                     </a:solidFill>
@@ -10009,7 +10361,7 @@
               </a:ln>
               <a:extLst>
                 <a:ext uri="{91240B29-F687-4f45-9708-019B960494DF}">
-                  <a14:hiddenLine xmlns="" xmlns:a14="http://schemas.microsoft.com/office/drawing/2010/main" w="9525">
+                  <a14:hiddenLine xmlns:a14="http://schemas.microsoft.com/office/drawing/2010/main" xmlns="" w="9525">
                     <a:solidFill>
                       <a:srgbClr val="000000"/>
                     </a:solidFill>
@@ -10071,7 +10423,7 @@
               </a:ln>
               <a:extLst>
                 <a:ext uri="{91240B29-F687-4f45-9708-019B960494DF}">
-                  <a14:hiddenLine xmlns="" xmlns:a14="http://schemas.microsoft.com/office/drawing/2010/main" w="9525">
+                  <a14:hiddenLine xmlns:a14="http://schemas.microsoft.com/office/drawing/2010/main" xmlns="" w="9525">
                     <a:solidFill>
                       <a:srgbClr val="000000"/>
                     </a:solidFill>
@@ -10161,7 +10513,7 @@
               </a:ln>
               <a:extLst>
                 <a:ext uri="{91240B29-F687-4f45-9708-019B960494DF}">
-                  <a14:hiddenLine xmlns="" xmlns:a14="http://schemas.microsoft.com/office/drawing/2010/main" w="9525">
+                  <a14:hiddenLine xmlns:a14="http://schemas.microsoft.com/office/drawing/2010/main" xmlns="" w="9525">
                     <a:solidFill>
                       <a:srgbClr val="000000"/>
                     </a:solidFill>
@@ -10195,7 +10547,7 @@
               </a:ln>
               <a:extLst>
                 <a:ext uri="{91240B29-F687-4f45-9708-019B960494DF}">
-                  <a14:hiddenLine xmlns="" xmlns:a14="http://schemas.microsoft.com/office/drawing/2010/main" w="9525">
+                  <a14:hiddenLine xmlns:a14="http://schemas.microsoft.com/office/drawing/2010/main" xmlns="" w="9525">
                     <a:solidFill>
                       <a:srgbClr val="000000"/>
                     </a:solidFill>
@@ -10260,7 +10612,7 @@
               </a:ln>
               <a:extLst>
                 <a:ext uri="{91240B29-F687-4f45-9708-019B960494DF}">
-                  <a14:hiddenLine xmlns="" xmlns:a14="http://schemas.microsoft.com/office/drawing/2010/main" w="9525">
+                  <a14:hiddenLine xmlns:a14="http://schemas.microsoft.com/office/drawing/2010/main" xmlns="" w="9525">
                     <a:solidFill>
                       <a:srgbClr val="000000"/>
                     </a:solidFill>
@@ -10350,7 +10702,7 @@
               </a:ln>
               <a:extLst>
                 <a:ext uri="{91240B29-F687-4f45-9708-019B960494DF}">
-                  <a14:hiddenLine xmlns="" xmlns:a14="http://schemas.microsoft.com/office/drawing/2010/main" w="9525">
+                  <a14:hiddenLine xmlns:a14="http://schemas.microsoft.com/office/drawing/2010/main" xmlns="" w="9525">
                     <a:solidFill>
                       <a:srgbClr val="000000"/>
                     </a:solidFill>
@@ -10412,7 +10764,7 @@
               </a:ln>
               <a:extLst>
                 <a:ext uri="{91240B29-F687-4f45-9708-019B960494DF}">
-                  <a14:hiddenLine xmlns="" xmlns:a14="http://schemas.microsoft.com/office/drawing/2010/main" w="9525">
+                  <a14:hiddenLine xmlns:a14="http://schemas.microsoft.com/office/drawing/2010/main" xmlns="" w="9525">
                     <a:solidFill>
                       <a:srgbClr val="000000"/>
                     </a:solidFill>
@@ -10502,7 +10854,7 @@
               </a:ln>
               <a:extLst>
                 <a:ext uri="{91240B29-F687-4f45-9708-019B960494DF}">
-                  <a14:hiddenLine xmlns="" xmlns:a14="http://schemas.microsoft.com/office/drawing/2010/main" w="9525">
+                  <a14:hiddenLine xmlns:a14="http://schemas.microsoft.com/office/drawing/2010/main" xmlns="" w="9525">
                     <a:solidFill>
                       <a:srgbClr val="000000"/>
                     </a:solidFill>
@@ -10567,7 +10919,7 @@
               </a:ln>
               <a:extLst>
                 <a:ext uri="{91240B29-F687-4f45-9708-019B960494DF}">
-                  <a14:hiddenLine xmlns="" xmlns:a14="http://schemas.microsoft.com/office/drawing/2010/main" w="9525">
+                  <a14:hiddenLine xmlns:a14="http://schemas.microsoft.com/office/drawing/2010/main" xmlns="" w="9525">
                     <a:solidFill>
                       <a:srgbClr val="000000"/>
                     </a:solidFill>
@@ -10629,7 +10981,7 @@
               </a:ln>
               <a:extLst>
                 <a:ext uri="{91240B29-F687-4f45-9708-019B960494DF}">
-                  <a14:hiddenLine xmlns="" xmlns:a14="http://schemas.microsoft.com/office/drawing/2010/main" w="9525">
+                  <a14:hiddenLine xmlns:a14="http://schemas.microsoft.com/office/drawing/2010/main" xmlns="" w="9525">
                     <a:solidFill>
                       <a:srgbClr val="000000"/>
                     </a:solidFill>
@@ -10719,7 +11071,7 @@
               </a:ln>
               <a:extLst>
                 <a:ext uri="{91240B29-F687-4f45-9708-019B960494DF}">
-                  <a14:hiddenLine xmlns="" xmlns:a14="http://schemas.microsoft.com/office/drawing/2010/main" w="9525">
+                  <a14:hiddenLine xmlns:a14="http://schemas.microsoft.com/office/drawing/2010/main" xmlns="" w="9525">
                     <a:solidFill>
                       <a:srgbClr val="000000"/>
                     </a:solidFill>
@@ -10809,7 +11161,7 @@
               </a:ln>
               <a:extLst>
                 <a:ext uri="{91240B29-F687-4f45-9708-019B960494DF}">
-                  <a14:hiddenLine xmlns="" xmlns:a14="http://schemas.microsoft.com/office/drawing/2010/main" w="9525">
+                  <a14:hiddenLine xmlns:a14="http://schemas.microsoft.com/office/drawing/2010/main" xmlns="" w="9525">
                     <a:solidFill>
                       <a:srgbClr val="000000"/>
                     </a:solidFill>
@@ -10874,7 +11226,7 @@
               </a:ln>
               <a:extLst>
                 <a:ext uri="{91240B29-F687-4f45-9708-019B960494DF}">
-                  <a14:hiddenLine xmlns="" xmlns:a14="http://schemas.microsoft.com/office/drawing/2010/main" w="9525">
+                  <a14:hiddenLine xmlns:a14="http://schemas.microsoft.com/office/drawing/2010/main" xmlns="" w="9525">
                     <a:solidFill>
                       <a:srgbClr val="000000"/>
                     </a:solidFill>
@@ -10994,7 +11346,7 @@
               </a:ln>
               <a:extLst>
                 <a:ext uri="{91240B29-F687-4f45-9708-019B960494DF}">
-                  <a14:hiddenLine xmlns="" xmlns:a14="http://schemas.microsoft.com/office/drawing/2010/main" w="9525">
+                  <a14:hiddenLine xmlns:a14="http://schemas.microsoft.com/office/drawing/2010/main" xmlns="" w="9525">
                     <a:solidFill>
                       <a:srgbClr val="000000"/>
                     </a:solidFill>
@@ -11092,7 +11444,7 @@
               </a:ln>
               <a:extLst>
                 <a:ext uri="{91240B29-F687-4f45-9708-019B960494DF}">
-                  <a14:hiddenLine xmlns="" xmlns:a14="http://schemas.microsoft.com/office/drawing/2010/main" w="9525">
+                  <a14:hiddenLine xmlns:a14="http://schemas.microsoft.com/office/drawing/2010/main" xmlns="" w="9525">
                     <a:solidFill>
                       <a:srgbClr val="000000"/>
                     </a:solidFill>
@@ -11207,7 +11559,7 @@
               </a:ln>
               <a:extLst>
                 <a:ext uri="{91240B29-F687-4f45-9708-019B960494DF}">
-                  <a14:hiddenLine xmlns="" xmlns:a14="http://schemas.microsoft.com/office/drawing/2010/main" w="9525">
+                  <a14:hiddenLine xmlns:a14="http://schemas.microsoft.com/office/drawing/2010/main" xmlns="" w="9525">
                     <a:solidFill>
                       <a:srgbClr val="000000"/>
                     </a:solidFill>
@@ -11297,7 +11649,7 @@
               </a:ln>
               <a:extLst>
                 <a:ext uri="{91240B29-F687-4f45-9708-019B960494DF}">
-                  <a14:hiddenLine xmlns="" xmlns:a14="http://schemas.microsoft.com/office/drawing/2010/main" w="9525">
+                  <a14:hiddenLine xmlns:a14="http://schemas.microsoft.com/office/drawing/2010/main" xmlns="" w="9525">
                     <a:solidFill>
                       <a:srgbClr val="000000"/>
                     </a:solidFill>
@@ -11362,7 +11714,7 @@
               </a:ln>
               <a:extLst>
                 <a:ext uri="{91240B29-F687-4f45-9708-019B960494DF}">
-                  <a14:hiddenLine xmlns="" xmlns:a14="http://schemas.microsoft.com/office/drawing/2010/main" w="9525">
+                  <a14:hiddenLine xmlns:a14="http://schemas.microsoft.com/office/drawing/2010/main" xmlns="" w="9525">
                     <a:solidFill>
                       <a:srgbClr val="000000"/>
                     </a:solidFill>
@@ -11452,7 +11804,7 @@
               </a:ln>
               <a:extLst>
                 <a:ext uri="{91240B29-F687-4f45-9708-019B960494DF}">
-                  <a14:hiddenLine xmlns="" xmlns:a14="http://schemas.microsoft.com/office/drawing/2010/main" w="9525">
+                  <a14:hiddenLine xmlns:a14="http://schemas.microsoft.com/office/drawing/2010/main" xmlns="" w="9525">
                     <a:solidFill>
                       <a:srgbClr val="000000"/>
                     </a:solidFill>
@@ -11520,7 +11872,7 @@
               </a:ln>
               <a:extLst>
                 <a:ext uri="{91240B29-F687-4f45-9708-019B960494DF}">
-                  <a14:hiddenLine xmlns="" xmlns:a14="http://schemas.microsoft.com/office/drawing/2010/main" w="9525">
+                  <a14:hiddenLine xmlns:a14="http://schemas.microsoft.com/office/drawing/2010/main" xmlns="" w="9525">
                     <a:solidFill>
                       <a:srgbClr val="000000"/>
                     </a:solidFill>
@@ -11610,7 +11962,7 @@
               </a:ln>
               <a:extLst>
                 <a:ext uri="{91240B29-F687-4f45-9708-019B960494DF}">
-                  <a14:hiddenLine xmlns="" xmlns:a14="http://schemas.microsoft.com/office/drawing/2010/main" w="9525">
+                  <a14:hiddenLine xmlns:a14="http://schemas.microsoft.com/office/drawing/2010/main" xmlns="" w="9525">
                     <a:solidFill>
                       <a:srgbClr val="000000"/>
                     </a:solidFill>
@@ -11678,7 +12030,7 @@
               </a:ln>
               <a:extLst>
                 <a:ext uri="{91240B29-F687-4f45-9708-019B960494DF}">
-                  <a14:hiddenLine xmlns="" xmlns:a14="http://schemas.microsoft.com/office/drawing/2010/main" w="9525">
+                  <a14:hiddenLine xmlns:a14="http://schemas.microsoft.com/office/drawing/2010/main" xmlns="" w="9525">
                     <a:solidFill>
                       <a:srgbClr val="000000"/>
                     </a:solidFill>
@@ -11768,7 +12120,7 @@
               </a:ln>
               <a:extLst>
                 <a:ext uri="{91240B29-F687-4f45-9708-019B960494DF}">
-                  <a14:hiddenLine xmlns="" xmlns:a14="http://schemas.microsoft.com/office/drawing/2010/main" w="9525">
+                  <a14:hiddenLine xmlns:a14="http://schemas.microsoft.com/office/drawing/2010/main" xmlns="" w="9525">
                     <a:solidFill>
                       <a:srgbClr val="000000"/>
                     </a:solidFill>
@@ -11802,7 +12154,7 @@
               </a:ln>
               <a:extLst>
                 <a:ext uri="{91240B29-F687-4f45-9708-019B960494DF}">
-                  <a14:hiddenLine xmlns="" xmlns:a14="http://schemas.microsoft.com/office/drawing/2010/main" w="9525">
+                  <a14:hiddenLine xmlns:a14="http://schemas.microsoft.com/office/drawing/2010/main" xmlns="" w="9525">
                     <a:solidFill>
                       <a:srgbClr val="000000"/>
                     </a:solidFill>
@@ -11940,10 +12292,9 @@
             </a:lvl1pPr>
           </a:lstStyle>
           <a:p>
-            <a:fld id="{48A87A34-81AB-432B-8DAE-1953F412C126}" type="datetimeFigureOut">
-              <a:rPr lang="en-US" dirty="0"/>
-              <a:pPr/>
-              <a:t>3/28/18</a:t>
+            <a:fld id="{C58E6024-C5A8-EF4D-AFB6-F101F820D4A4}" type="datetime1">
+              <a:rPr lang="en-GB" smtClean="0"/>
+              <a:t>29/03/2018</a:t>
             </a:fld>
             <a:endParaRPr lang="en-US" dirty="0"/>
           </a:p>
@@ -12050,6 +12401,7 @@
     <p:sldLayoutId id="2147483658" r:id="rId16"/>
     <p:sldLayoutId id="2147483659" r:id="rId17"/>
   </p:sldLayoutIdLst>
+  <p:hf hdr="0" dt="0"/>
   <p:txStyles>
     <p:titleStyle>
       <a:lvl1pPr algn="l" defTabSz="914400" rtl="0" eaLnBrk="1" latinLnBrk="0" hangingPunct="1">
@@ -12457,21 +12809,15 @@
           </a:p>
           <a:p>
             <a:r>
-              <a:rPr lang="en-GB" cap="none" dirty="0">
-                <a:hlinkClick r:id="rId3"/>
-              </a:rPr>
+              <a:rPr lang="en-GB" cap="none" dirty="0"/>
               <a:t>https://</a:t>
             </a:r>
             <a:r>
-              <a:rPr lang="en-GB" cap="none" dirty="0" err="1">
-                <a:hlinkClick r:id="rId3"/>
-              </a:rPr>
+              <a:rPr lang="en-GB" cap="none" dirty="0" err="1"/>
               <a:t>goo.gl</a:t>
             </a:r>
             <a:r>
-              <a:rPr lang="en-GB" cap="none" dirty="0">
-                <a:hlinkClick r:id="rId3"/>
-              </a:rPr>
+              <a:rPr lang="en-GB" cap="none" dirty="0"/>
               <a:t>/e7HLiK</a:t>
             </a:r>
             <a:endParaRPr lang="en-US" cap="none" dirty="0"/>
@@ -12607,7 +12953,7 @@
             </a:pPr>
             <a:r>
               <a:rPr lang="en-US" dirty="0"/>
-              <a:t>Read the secret file</a:t>
+              <a:t>Read the secret file.</a:t>
             </a:r>
           </a:p>
           <a:p>
@@ -12938,6 +13284,60 @@
           </a:p>
         </p:txBody>
       </p:sp>
+      <p:sp>
+        <p:nvSpPr>
+          <p:cNvPr id="5" name="Footer Placeholder 4">
+            <a:extLst>
+              <a:ext uri="{FF2B5EF4-FFF2-40B4-BE49-F238E27FC236}">
+                <a16:creationId xmlns:a16="http://schemas.microsoft.com/office/drawing/2014/main" id="{2147A41B-9F8F-BA46-8E9C-5E6F2C904EA2}"/>
+              </a:ext>
+            </a:extLst>
+          </p:cNvPr>
+          <p:cNvSpPr>
+            <a:spLocks noGrp="1"/>
+          </p:cNvSpPr>
+          <p:nvPr>
+            <p:ph type="ftr" sz="quarter" idx="11"/>
+          </p:nvPr>
+        </p:nvSpPr>
+        <p:spPr/>
+        <p:txBody>
+          <a:bodyPr/>
+          <a:lstStyle/>
+          <a:p>
+            <a:endParaRPr lang="en-US" dirty="0"/>
+          </a:p>
+        </p:txBody>
+      </p:sp>
+      <p:sp>
+        <p:nvSpPr>
+          <p:cNvPr id="6" name="Slide Number Placeholder 5">
+            <a:extLst>
+              <a:ext uri="{FF2B5EF4-FFF2-40B4-BE49-F238E27FC236}">
+                <a16:creationId xmlns:a16="http://schemas.microsoft.com/office/drawing/2014/main" id="{048D2C7D-D4EC-A747-A11C-EB76C9D611E5}"/>
+              </a:ext>
+            </a:extLst>
+          </p:cNvPr>
+          <p:cNvSpPr>
+            <a:spLocks noGrp="1"/>
+          </p:cNvSpPr>
+          <p:nvPr>
+            <p:ph type="sldNum" sz="quarter" idx="12"/>
+          </p:nvPr>
+        </p:nvSpPr>
+        <p:spPr/>
+        <p:txBody>
+          <a:bodyPr/>
+          <a:lstStyle/>
+          <a:p>
+            <a:fld id="{6D22F896-40B5-4ADD-8801-0D06FADFA095}" type="slidenum">
+              <a:rPr lang="en-US" smtClean="0"/>
+              <a:t>10</a:t>
+            </a:fld>
+            <a:endParaRPr lang="en-US" dirty="0"/>
+          </a:p>
+        </p:txBody>
+      </p:sp>
     </p:spTree>
     <p:extLst>
       <p:ext uri="{BB962C8B-B14F-4D97-AF65-F5344CB8AC3E}">
@@ -13082,7 +13482,7 @@
                   <a:schemeClr val="bg1"/>
                 </a:solidFill>
               </a:rPr>
-              <a:t> - Given an index, return the x, y coordinates in an image</a:t>
+              <a:t> - Given an index, return the x, y coordinates of an image</a:t>
             </a:r>
           </a:p>
           <a:p>
@@ -13300,6 +13700,60 @@
               </a:rPr>
               <a:t> – Get a bit from a byte array</a:t>
             </a:r>
+          </a:p>
+        </p:txBody>
+      </p:sp>
+      <p:sp>
+        <p:nvSpPr>
+          <p:cNvPr id="4" name="Footer Placeholder 3">
+            <a:extLst>
+              <a:ext uri="{FF2B5EF4-FFF2-40B4-BE49-F238E27FC236}">
+                <a16:creationId xmlns:a16="http://schemas.microsoft.com/office/drawing/2014/main" id="{219D9B96-6C7B-DE45-AB5A-E951D1828E87}"/>
+              </a:ext>
+            </a:extLst>
+          </p:cNvPr>
+          <p:cNvSpPr>
+            <a:spLocks noGrp="1"/>
+          </p:cNvSpPr>
+          <p:nvPr>
+            <p:ph type="ftr" sz="quarter" idx="11"/>
+          </p:nvPr>
+        </p:nvSpPr>
+        <p:spPr/>
+        <p:txBody>
+          <a:bodyPr/>
+          <a:lstStyle/>
+          <a:p>
+            <a:endParaRPr lang="en-US" dirty="0"/>
+          </a:p>
+        </p:txBody>
+      </p:sp>
+      <p:sp>
+        <p:nvSpPr>
+          <p:cNvPr id="5" name="Slide Number Placeholder 4">
+            <a:extLst>
+              <a:ext uri="{FF2B5EF4-FFF2-40B4-BE49-F238E27FC236}">
+                <a16:creationId xmlns:a16="http://schemas.microsoft.com/office/drawing/2014/main" id="{F9176363-1DAE-E54E-B28A-6A9256DA6D09}"/>
+              </a:ext>
+            </a:extLst>
+          </p:cNvPr>
+          <p:cNvSpPr>
+            <a:spLocks noGrp="1"/>
+          </p:cNvSpPr>
+          <p:nvPr>
+            <p:ph type="sldNum" sz="quarter" idx="12"/>
+          </p:nvPr>
+        </p:nvSpPr>
+        <p:spPr/>
+        <p:txBody>
+          <a:bodyPr/>
+          <a:lstStyle/>
+          <a:p>
+            <a:fld id="{6D22F896-40B5-4ADD-8801-0D06FADFA095}" type="slidenum">
+              <a:rPr lang="en-US" smtClean="0"/>
+              <a:t>11</a:t>
+            </a:fld>
+            <a:endParaRPr lang="en-US" dirty="0"/>
           </a:p>
         </p:txBody>
       </p:sp>
@@ -13441,6 +13895,60 @@
           </a:p>
         </p:txBody>
       </p:sp>
+      <p:sp>
+        <p:nvSpPr>
+          <p:cNvPr id="4" name="Footer Placeholder 3">
+            <a:extLst>
+              <a:ext uri="{FF2B5EF4-FFF2-40B4-BE49-F238E27FC236}">
+                <a16:creationId xmlns:a16="http://schemas.microsoft.com/office/drawing/2014/main" id="{864417DC-CC1E-ED43-9730-22ECC32EE0B5}"/>
+              </a:ext>
+            </a:extLst>
+          </p:cNvPr>
+          <p:cNvSpPr>
+            <a:spLocks noGrp="1"/>
+          </p:cNvSpPr>
+          <p:nvPr>
+            <p:ph type="ftr" sz="quarter" idx="11"/>
+          </p:nvPr>
+        </p:nvSpPr>
+        <p:spPr/>
+        <p:txBody>
+          <a:bodyPr/>
+          <a:lstStyle/>
+          <a:p>
+            <a:endParaRPr lang="en-US" dirty="0"/>
+          </a:p>
+        </p:txBody>
+      </p:sp>
+      <p:sp>
+        <p:nvSpPr>
+          <p:cNvPr id="5" name="Slide Number Placeholder 4">
+            <a:extLst>
+              <a:ext uri="{FF2B5EF4-FFF2-40B4-BE49-F238E27FC236}">
+                <a16:creationId xmlns:a16="http://schemas.microsoft.com/office/drawing/2014/main" id="{A22EB552-3E2A-D246-9919-F907FBC733A7}"/>
+              </a:ext>
+            </a:extLst>
+          </p:cNvPr>
+          <p:cNvSpPr>
+            <a:spLocks noGrp="1"/>
+          </p:cNvSpPr>
+          <p:nvPr>
+            <p:ph type="sldNum" sz="quarter" idx="12"/>
+          </p:nvPr>
+        </p:nvSpPr>
+        <p:spPr/>
+        <p:txBody>
+          <a:bodyPr/>
+          <a:lstStyle/>
+          <a:p>
+            <a:fld id="{6D22F896-40B5-4ADD-8801-0D06FADFA095}" type="slidenum">
+              <a:rPr lang="en-US" smtClean="0"/>
+              <a:t>12</a:t>
+            </a:fld>
+            <a:endParaRPr lang="en-US" dirty="0"/>
+          </a:p>
+        </p:txBody>
+      </p:sp>
     </p:spTree>
     <p:extLst>
       <p:ext uri="{BB962C8B-B14F-4D97-AF65-F5344CB8AC3E}">
@@ -13547,6 +14055,60 @@
               <a:rPr lang="en-US" dirty="0"/>
               <a:t>Have a go</a:t>
             </a:r>
+          </a:p>
+        </p:txBody>
+      </p:sp>
+      <p:sp>
+        <p:nvSpPr>
+          <p:cNvPr id="4" name="Footer Placeholder 3">
+            <a:extLst>
+              <a:ext uri="{FF2B5EF4-FFF2-40B4-BE49-F238E27FC236}">
+                <a16:creationId xmlns:a16="http://schemas.microsoft.com/office/drawing/2014/main" id="{3C698E39-D973-8F4D-86B9-5F795F3B40BD}"/>
+              </a:ext>
+            </a:extLst>
+          </p:cNvPr>
+          <p:cNvSpPr>
+            <a:spLocks noGrp="1"/>
+          </p:cNvSpPr>
+          <p:nvPr>
+            <p:ph type="ftr" sz="quarter" idx="11"/>
+          </p:nvPr>
+        </p:nvSpPr>
+        <p:spPr/>
+        <p:txBody>
+          <a:bodyPr/>
+          <a:lstStyle/>
+          <a:p>
+            <a:endParaRPr lang="en-US" dirty="0"/>
+          </a:p>
+        </p:txBody>
+      </p:sp>
+      <p:sp>
+        <p:nvSpPr>
+          <p:cNvPr id="5" name="Slide Number Placeholder 4">
+            <a:extLst>
+              <a:ext uri="{FF2B5EF4-FFF2-40B4-BE49-F238E27FC236}">
+                <a16:creationId xmlns:a16="http://schemas.microsoft.com/office/drawing/2014/main" id="{3312A98F-59A1-4845-8A56-8B30DBA908BE}"/>
+              </a:ext>
+            </a:extLst>
+          </p:cNvPr>
+          <p:cNvSpPr>
+            <a:spLocks noGrp="1"/>
+          </p:cNvSpPr>
+          <p:nvPr>
+            <p:ph type="sldNum" sz="quarter" idx="12"/>
+          </p:nvPr>
+        </p:nvSpPr>
+        <p:spPr/>
+        <p:txBody>
+          <a:bodyPr/>
+          <a:lstStyle/>
+          <a:p>
+            <a:fld id="{6D22F896-40B5-4ADD-8801-0D06FADFA095}" type="slidenum">
+              <a:rPr lang="en-US" smtClean="0"/>
+              <a:t>2</a:t>
+            </a:fld>
+            <a:endParaRPr lang="en-US" dirty="0"/>
           </a:p>
         </p:txBody>
       </p:sp>
@@ -13641,7 +14203,7 @@
           <a:p>
             <a:r>
               <a:rPr lang="en-US" dirty="0"/>
-              <a:t>Steganography means data hiding.  </a:t>
+              <a:t>Steganography means hiding data.  </a:t>
             </a:r>
           </a:p>
           <a:p>
@@ -13661,6 +14223,60 @@
               <a:rPr lang="en-US" dirty="0"/>
               <a:t>We will be talking about steganography in images.</a:t>
             </a:r>
+          </a:p>
+        </p:txBody>
+      </p:sp>
+      <p:sp>
+        <p:nvSpPr>
+          <p:cNvPr id="4" name="Footer Placeholder 3">
+            <a:extLst>
+              <a:ext uri="{FF2B5EF4-FFF2-40B4-BE49-F238E27FC236}">
+                <a16:creationId xmlns:a16="http://schemas.microsoft.com/office/drawing/2014/main" id="{4375FADB-93A6-814F-85B5-8C7B205FF21C}"/>
+              </a:ext>
+            </a:extLst>
+          </p:cNvPr>
+          <p:cNvSpPr>
+            <a:spLocks noGrp="1"/>
+          </p:cNvSpPr>
+          <p:nvPr>
+            <p:ph type="ftr" sz="quarter" idx="11"/>
+          </p:nvPr>
+        </p:nvSpPr>
+        <p:spPr/>
+        <p:txBody>
+          <a:bodyPr/>
+          <a:lstStyle/>
+          <a:p>
+            <a:endParaRPr lang="en-US" dirty="0"/>
+          </a:p>
+        </p:txBody>
+      </p:sp>
+      <p:sp>
+        <p:nvSpPr>
+          <p:cNvPr id="5" name="Slide Number Placeholder 4">
+            <a:extLst>
+              <a:ext uri="{FF2B5EF4-FFF2-40B4-BE49-F238E27FC236}">
+                <a16:creationId xmlns:a16="http://schemas.microsoft.com/office/drawing/2014/main" id="{3FA8AA31-D4F4-074B-A6C6-2FC4C9971E5C}"/>
+              </a:ext>
+            </a:extLst>
+          </p:cNvPr>
+          <p:cNvSpPr>
+            <a:spLocks noGrp="1"/>
+          </p:cNvSpPr>
+          <p:nvPr>
+            <p:ph type="sldNum" sz="quarter" idx="12"/>
+          </p:nvPr>
+        </p:nvSpPr>
+        <p:spPr/>
+        <p:txBody>
+          <a:bodyPr/>
+          <a:lstStyle/>
+          <a:p>
+            <a:fld id="{6D22F896-40B5-4ADD-8801-0D06FADFA095}" type="slidenum">
+              <a:rPr lang="en-US" smtClean="0"/>
+              <a:t>3</a:t>
+            </a:fld>
+            <a:endParaRPr lang="en-US" dirty="0"/>
           </a:p>
         </p:txBody>
       </p:sp>
@@ -13833,6 +14449,60 @@
               <a:rPr lang="en-GB" dirty="0"/>
               <a:t>, 1998</a:t>
             </a:r>
+            <a:endParaRPr lang="en-US" dirty="0"/>
+          </a:p>
+        </p:txBody>
+      </p:sp>
+      <p:sp>
+        <p:nvSpPr>
+          <p:cNvPr id="5" name="Footer Placeholder 4">
+            <a:extLst>
+              <a:ext uri="{FF2B5EF4-FFF2-40B4-BE49-F238E27FC236}">
+                <a16:creationId xmlns:a16="http://schemas.microsoft.com/office/drawing/2014/main" id="{818EA4CC-2895-7A46-A8F0-CC247DADA7F4}"/>
+              </a:ext>
+            </a:extLst>
+          </p:cNvPr>
+          <p:cNvSpPr>
+            <a:spLocks noGrp="1"/>
+          </p:cNvSpPr>
+          <p:nvPr>
+            <p:ph type="ftr" sz="quarter" idx="11"/>
+          </p:nvPr>
+        </p:nvSpPr>
+        <p:spPr/>
+        <p:txBody>
+          <a:bodyPr/>
+          <a:lstStyle/>
+          <a:p>
+            <a:endParaRPr lang="en-US" dirty="0"/>
+          </a:p>
+        </p:txBody>
+      </p:sp>
+      <p:sp>
+        <p:nvSpPr>
+          <p:cNvPr id="6" name="Slide Number Placeholder 5">
+            <a:extLst>
+              <a:ext uri="{FF2B5EF4-FFF2-40B4-BE49-F238E27FC236}">
+                <a16:creationId xmlns:a16="http://schemas.microsoft.com/office/drawing/2014/main" id="{C1AFC7E8-4D85-9A4A-A7AF-CD74BA5FEFD4}"/>
+              </a:ext>
+            </a:extLst>
+          </p:cNvPr>
+          <p:cNvSpPr>
+            <a:spLocks noGrp="1"/>
+          </p:cNvSpPr>
+          <p:nvPr>
+            <p:ph type="sldNum" sz="quarter" idx="12"/>
+          </p:nvPr>
+        </p:nvSpPr>
+        <p:spPr/>
+        <p:txBody>
+          <a:bodyPr/>
+          <a:lstStyle/>
+          <a:p>
+            <a:fld id="{6D22F896-40B5-4ADD-8801-0D06FADFA095}" type="slidenum">
+              <a:rPr lang="en-US" smtClean="0"/>
+              <a:t>4</a:t>
+            </a:fld>
             <a:endParaRPr lang="en-US" dirty="0"/>
           </a:p>
         </p:txBody>
@@ -14099,6 +14769,60 @@
           </a:p>
         </p:txBody>
       </p:sp>
+      <p:sp>
+        <p:nvSpPr>
+          <p:cNvPr id="3" name="Footer Placeholder 2">
+            <a:extLst>
+              <a:ext uri="{FF2B5EF4-FFF2-40B4-BE49-F238E27FC236}">
+                <a16:creationId xmlns:a16="http://schemas.microsoft.com/office/drawing/2014/main" id="{786D9C94-F53B-2B42-B233-0E9334AD9C0D}"/>
+              </a:ext>
+            </a:extLst>
+          </p:cNvPr>
+          <p:cNvSpPr>
+            <a:spLocks noGrp="1"/>
+          </p:cNvSpPr>
+          <p:nvPr>
+            <p:ph type="ftr" sz="quarter" idx="11"/>
+          </p:nvPr>
+        </p:nvSpPr>
+        <p:spPr/>
+        <p:txBody>
+          <a:bodyPr/>
+          <a:lstStyle/>
+          <a:p>
+            <a:endParaRPr lang="en-US" dirty="0"/>
+          </a:p>
+        </p:txBody>
+      </p:sp>
+      <p:sp>
+        <p:nvSpPr>
+          <p:cNvPr id="4" name="Slide Number Placeholder 3">
+            <a:extLst>
+              <a:ext uri="{FF2B5EF4-FFF2-40B4-BE49-F238E27FC236}">
+                <a16:creationId xmlns:a16="http://schemas.microsoft.com/office/drawing/2014/main" id="{D9A21A22-0F95-CB47-8319-99937027EBDE}"/>
+              </a:ext>
+            </a:extLst>
+          </p:cNvPr>
+          <p:cNvSpPr>
+            <a:spLocks noGrp="1"/>
+          </p:cNvSpPr>
+          <p:nvPr>
+            <p:ph type="sldNum" sz="quarter" idx="12"/>
+          </p:nvPr>
+        </p:nvSpPr>
+        <p:spPr/>
+        <p:txBody>
+          <a:bodyPr/>
+          <a:lstStyle/>
+          <a:p>
+            <a:fld id="{6D22F896-40B5-4ADD-8801-0D06FADFA095}" type="slidenum">
+              <a:rPr lang="en-US" smtClean="0"/>
+              <a:t>5</a:t>
+            </a:fld>
+            <a:endParaRPr lang="en-US" dirty="0"/>
+          </a:p>
+        </p:txBody>
+      </p:sp>
     </p:spTree>
     <p:extLst>
       <p:ext uri="{BB962C8B-B14F-4D97-AF65-F5344CB8AC3E}">
@@ -14266,6 +14990,60 @@
               <a:rPr lang="en-US" dirty="0"/>
               <a:t>Each R, G, B part is a byte ranging from 0 - 255</a:t>
             </a:r>
+          </a:p>
+        </p:txBody>
+      </p:sp>
+      <p:sp>
+        <p:nvSpPr>
+          <p:cNvPr id="3" name="Footer Placeholder 2">
+            <a:extLst>
+              <a:ext uri="{FF2B5EF4-FFF2-40B4-BE49-F238E27FC236}">
+                <a16:creationId xmlns:a16="http://schemas.microsoft.com/office/drawing/2014/main" id="{716ABDEC-9C5F-B548-8FDF-B8499451EEA8}"/>
+              </a:ext>
+            </a:extLst>
+          </p:cNvPr>
+          <p:cNvSpPr>
+            <a:spLocks noGrp="1"/>
+          </p:cNvSpPr>
+          <p:nvPr>
+            <p:ph type="ftr" sz="quarter" idx="11"/>
+          </p:nvPr>
+        </p:nvSpPr>
+        <p:spPr/>
+        <p:txBody>
+          <a:bodyPr/>
+          <a:lstStyle/>
+          <a:p>
+            <a:endParaRPr lang="en-US" dirty="0"/>
+          </a:p>
+        </p:txBody>
+      </p:sp>
+      <p:sp>
+        <p:nvSpPr>
+          <p:cNvPr id="4" name="Slide Number Placeholder 3">
+            <a:extLst>
+              <a:ext uri="{FF2B5EF4-FFF2-40B4-BE49-F238E27FC236}">
+                <a16:creationId xmlns:a16="http://schemas.microsoft.com/office/drawing/2014/main" id="{FC576A45-EAF1-2C46-B218-7D113EC4A302}"/>
+              </a:ext>
+            </a:extLst>
+          </p:cNvPr>
+          <p:cNvSpPr>
+            <a:spLocks noGrp="1"/>
+          </p:cNvSpPr>
+          <p:nvPr>
+            <p:ph type="sldNum" sz="quarter" idx="12"/>
+          </p:nvPr>
+        </p:nvSpPr>
+        <p:spPr/>
+        <p:txBody>
+          <a:bodyPr/>
+          <a:lstStyle/>
+          <a:p>
+            <a:fld id="{6D22F896-40B5-4ADD-8801-0D06FADFA095}" type="slidenum">
+              <a:rPr lang="en-US" smtClean="0"/>
+              <a:t>6</a:t>
+            </a:fld>
+            <a:endParaRPr lang="en-US" dirty="0"/>
           </a:p>
         </p:txBody>
       </p:sp>
@@ -14796,6 +15574,60 @@
           </a:p>
         </p:txBody>
       </p:sp>
+      <p:sp>
+        <p:nvSpPr>
+          <p:cNvPr id="3" name="Footer Placeholder 2">
+            <a:extLst>
+              <a:ext uri="{FF2B5EF4-FFF2-40B4-BE49-F238E27FC236}">
+                <a16:creationId xmlns:a16="http://schemas.microsoft.com/office/drawing/2014/main" id="{4013A2F1-87AB-D24A-BC6C-55E02C252A4B}"/>
+              </a:ext>
+            </a:extLst>
+          </p:cNvPr>
+          <p:cNvSpPr>
+            <a:spLocks noGrp="1"/>
+          </p:cNvSpPr>
+          <p:nvPr>
+            <p:ph type="ftr" sz="quarter" idx="11"/>
+          </p:nvPr>
+        </p:nvSpPr>
+        <p:spPr/>
+        <p:txBody>
+          <a:bodyPr/>
+          <a:lstStyle/>
+          <a:p>
+            <a:endParaRPr lang="en-US" dirty="0"/>
+          </a:p>
+        </p:txBody>
+      </p:sp>
+      <p:sp>
+        <p:nvSpPr>
+          <p:cNvPr id="4" name="Slide Number Placeholder 3">
+            <a:extLst>
+              <a:ext uri="{FF2B5EF4-FFF2-40B4-BE49-F238E27FC236}">
+                <a16:creationId xmlns:a16="http://schemas.microsoft.com/office/drawing/2014/main" id="{B634B3C2-A865-4547-ABC4-B8778C4D4A1E}"/>
+              </a:ext>
+            </a:extLst>
+          </p:cNvPr>
+          <p:cNvSpPr>
+            <a:spLocks noGrp="1"/>
+          </p:cNvSpPr>
+          <p:nvPr>
+            <p:ph type="sldNum" sz="quarter" idx="12"/>
+          </p:nvPr>
+        </p:nvSpPr>
+        <p:spPr/>
+        <p:txBody>
+          <a:bodyPr/>
+          <a:lstStyle/>
+          <a:p>
+            <a:fld id="{6D22F896-40B5-4ADD-8801-0D06FADFA095}" type="slidenum">
+              <a:rPr lang="en-US" smtClean="0"/>
+              <a:t>7</a:t>
+            </a:fld>
+            <a:endParaRPr lang="en-US" dirty="0"/>
+          </a:p>
+        </p:txBody>
+      </p:sp>
     </p:spTree>
     <p:extLst>
       <p:ext uri="{BB962C8B-B14F-4D97-AF65-F5344CB8AC3E}">
@@ -15360,6 +16192,60 @@
               <a:rPr lang="en-US" dirty="0"/>
               <a:t>RGB( 0, 0, 254 )</a:t>
             </a:r>
+          </a:p>
+        </p:txBody>
+      </p:sp>
+      <p:sp>
+        <p:nvSpPr>
+          <p:cNvPr id="3" name="Footer Placeholder 2">
+            <a:extLst>
+              <a:ext uri="{FF2B5EF4-FFF2-40B4-BE49-F238E27FC236}">
+                <a16:creationId xmlns:a16="http://schemas.microsoft.com/office/drawing/2014/main" id="{0478CC43-8B97-A34D-89E0-070CDD2790FC}"/>
+              </a:ext>
+            </a:extLst>
+          </p:cNvPr>
+          <p:cNvSpPr>
+            <a:spLocks noGrp="1"/>
+          </p:cNvSpPr>
+          <p:nvPr>
+            <p:ph type="ftr" sz="quarter" idx="11"/>
+          </p:nvPr>
+        </p:nvSpPr>
+        <p:spPr/>
+        <p:txBody>
+          <a:bodyPr/>
+          <a:lstStyle/>
+          <a:p>
+            <a:endParaRPr lang="en-US" dirty="0"/>
+          </a:p>
+        </p:txBody>
+      </p:sp>
+      <p:sp>
+        <p:nvSpPr>
+          <p:cNvPr id="4" name="Slide Number Placeholder 3">
+            <a:extLst>
+              <a:ext uri="{FF2B5EF4-FFF2-40B4-BE49-F238E27FC236}">
+                <a16:creationId xmlns:a16="http://schemas.microsoft.com/office/drawing/2014/main" id="{3A4EFE36-79B0-8A41-B57F-65F7E3B35A48}"/>
+              </a:ext>
+            </a:extLst>
+          </p:cNvPr>
+          <p:cNvSpPr>
+            <a:spLocks noGrp="1"/>
+          </p:cNvSpPr>
+          <p:nvPr>
+            <p:ph type="sldNum" sz="quarter" idx="12"/>
+          </p:nvPr>
+        </p:nvSpPr>
+        <p:spPr/>
+        <p:txBody>
+          <a:bodyPr/>
+          <a:lstStyle/>
+          <a:p>
+            <a:fld id="{6D22F896-40B5-4ADD-8801-0D06FADFA095}" type="slidenum">
+              <a:rPr lang="en-US" smtClean="0"/>
+              <a:t>8</a:t>
+            </a:fld>
+            <a:endParaRPr lang="en-US" dirty="0"/>
           </a:p>
         </p:txBody>
       </p:sp>
@@ -17153,6 +18039,60 @@
           </a:p>
         </p:txBody>
       </p:sp>
+      <p:sp>
+        <p:nvSpPr>
+          <p:cNvPr id="4" name="Footer Placeholder 3">
+            <a:extLst>
+              <a:ext uri="{FF2B5EF4-FFF2-40B4-BE49-F238E27FC236}">
+                <a16:creationId xmlns:a16="http://schemas.microsoft.com/office/drawing/2014/main" id="{B0E2456F-68BA-F14F-881C-F9B90872059D}"/>
+              </a:ext>
+            </a:extLst>
+          </p:cNvPr>
+          <p:cNvSpPr>
+            <a:spLocks noGrp="1"/>
+          </p:cNvSpPr>
+          <p:nvPr>
+            <p:ph type="ftr" sz="quarter" idx="11"/>
+          </p:nvPr>
+        </p:nvSpPr>
+        <p:spPr/>
+        <p:txBody>
+          <a:bodyPr/>
+          <a:lstStyle/>
+          <a:p>
+            <a:endParaRPr lang="en-US" dirty="0"/>
+          </a:p>
+        </p:txBody>
+      </p:sp>
+      <p:sp>
+        <p:nvSpPr>
+          <p:cNvPr id="5" name="Slide Number Placeholder 4">
+            <a:extLst>
+              <a:ext uri="{FF2B5EF4-FFF2-40B4-BE49-F238E27FC236}">
+                <a16:creationId xmlns:a16="http://schemas.microsoft.com/office/drawing/2014/main" id="{A6F13C7A-3477-1E45-8926-24C65836A72F}"/>
+              </a:ext>
+            </a:extLst>
+          </p:cNvPr>
+          <p:cNvSpPr>
+            <a:spLocks noGrp="1"/>
+          </p:cNvSpPr>
+          <p:nvPr>
+            <p:ph type="sldNum" sz="quarter" idx="12"/>
+          </p:nvPr>
+        </p:nvSpPr>
+        <p:spPr/>
+        <p:txBody>
+          <a:bodyPr/>
+          <a:lstStyle/>
+          <a:p>
+            <a:fld id="{6D22F896-40B5-4ADD-8801-0D06FADFA095}" type="slidenum">
+              <a:rPr lang="en-US" smtClean="0"/>
+              <a:t>9</a:t>
+            </a:fld>
+            <a:endParaRPr lang="en-US" dirty="0"/>
+          </a:p>
+        </p:txBody>
+      </p:sp>
     </p:spTree>
     <p:extLst>
       <p:ext uri="{BB962C8B-B14F-4D97-AF65-F5344CB8AC3E}">
@@ -17415,4 +18355,299 @@
     </a:ext>
   </a:extLst>
 </a:theme>
+</file>
+
+<file path=ppt/theme/theme2.xml><?xml version="1.0" encoding="utf-8"?>
+<a:theme xmlns:a="http://schemas.openxmlformats.org/drawingml/2006/main" name="Office Theme">
+  <a:themeElements>
+    <a:clrScheme name="Office">
+      <a:dk1>
+        <a:sysClr val="windowText" lastClr="000000"/>
+      </a:dk1>
+      <a:lt1>
+        <a:sysClr val="window" lastClr="FFFFFF"/>
+      </a:lt1>
+      <a:dk2>
+        <a:srgbClr val="44546A"/>
+      </a:dk2>
+      <a:lt2>
+        <a:srgbClr val="E7E6E6"/>
+      </a:lt2>
+      <a:accent1>
+        <a:srgbClr val="4472C4"/>
+      </a:accent1>
+      <a:accent2>
+        <a:srgbClr val="ED7D31"/>
+      </a:accent2>
+      <a:accent3>
+        <a:srgbClr val="A5A5A5"/>
+      </a:accent3>
+      <a:accent4>
+        <a:srgbClr val="FFC000"/>
+      </a:accent4>
+      <a:accent5>
+        <a:srgbClr val="5B9BD5"/>
+      </a:accent5>
+      <a:accent6>
+        <a:srgbClr val="70AD47"/>
+      </a:accent6>
+      <a:hlink>
+        <a:srgbClr val="0563C1"/>
+      </a:hlink>
+      <a:folHlink>
+        <a:srgbClr val="954F72"/>
+      </a:folHlink>
+    </a:clrScheme>
+    <a:fontScheme name="Office">
+      <a:majorFont>
+        <a:latin typeface="Calibri Light" panose="020F0302020204030204"/>
+        <a:ea typeface=""/>
+        <a:cs typeface=""/>
+        <a:font script="Jpan" typeface="游ゴシック Light"/>
+        <a:font script="Hang" typeface="맑은 고딕"/>
+        <a:font script="Hans" typeface="等线 Light"/>
+        <a:font script="Hant" typeface="新細明體"/>
+        <a:font script="Arab" typeface="Times New Roman"/>
+        <a:font script="Hebr" typeface="Times New Roman"/>
+        <a:font script="Thai" typeface="Angsana New"/>
+        <a:font script="Ethi" typeface="Nyala"/>
+        <a:font script="Beng" typeface="Vrinda"/>
+        <a:font script="Gujr" typeface="Shruti"/>
+        <a:font script="Khmr" typeface="MoolBoran"/>
+        <a:font script="Knda" typeface="Tunga"/>
+        <a:font script="Guru" typeface="Raavi"/>
+        <a:font script="Cans" typeface="Euphemia"/>
+        <a:font script="Cher" typeface="Plantagenet Cherokee"/>
+        <a:font script="Yiii" typeface="Microsoft Yi Baiti"/>
+        <a:font script="Tibt" typeface="Microsoft Himalaya"/>
+        <a:font script="Thaa" typeface="MV Boli"/>
+        <a:font script="Deva" typeface="Mangal"/>
+        <a:font script="Telu" typeface="Gautami"/>
+        <a:font script="Taml" typeface="Latha"/>
+        <a:font script="Syrc" typeface="Estrangelo Edessa"/>
+        <a:font script="Orya" typeface="Kalinga"/>
+        <a:font script="Mlym" typeface="Kartika"/>
+        <a:font script="Laoo" typeface="DokChampa"/>
+        <a:font script="Sinh" typeface="Iskoola Pota"/>
+        <a:font script="Mong" typeface="Mongolian Baiti"/>
+        <a:font script="Viet" typeface="Times New Roman"/>
+        <a:font script="Uigh" typeface="Microsoft Uighur"/>
+        <a:font script="Geor" typeface="Sylfaen"/>
+        <a:font script="Armn" typeface="Arial"/>
+        <a:font script="Bugi" typeface="Leelawadee UI"/>
+        <a:font script="Bopo" typeface="Microsoft JhengHei"/>
+        <a:font script="Java" typeface="Javanese Text"/>
+        <a:font script="Lisu" typeface="Segoe UI"/>
+        <a:font script="Mymr" typeface="Myanmar Text"/>
+        <a:font script="Nkoo" typeface="Ebrima"/>
+        <a:font script="Olck" typeface="Nirmala UI"/>
+        <a:font script="Osma" typeface="Ebrima"/>
+        <a:font script="Phag" typeface="Phagspa"/>
+        <a:font script="Syrn" typeface="Estrangelo Edessa"/>
+        <a:font script="Syrj" typeface="Estrangelo Edessa"/>
+        <a:font script="Syre" typeface="Estrangelo Edessa"/>
+        <a:font script="Sora" typeface="Nirmala UI"/>
+        <a:font script="Tale" typeface="Microsoft Tai Le"/>
+        <a:font script="Talu" typeface="Microsoft New Tai Lue"/>
+        <a:font script="Tfng" typeface="Ebrima"/>
+      </a:majorFont>
+      <a:minorFont>
+        <a:latin typeface="Calibri" panose="020F0502020204030204"/>
+        <a:ea typeface=""/>
+        <a:cs typeface=""/>
+        <a:font script="Jpan" typeface="游ゴシック"/>
+        <a:font script="Hang" typeface="맑은 고딕"/>
+        <a:font script="Hans" typeface="等线"/>
+        <a:font script="Hant" typeface="新細明體"/>
+        <a:font script="Arab" typeface="Arial"/>
+        <a:font script="Hebr" typeface="Arial"/>
+        <a:font script="Thai" typeface="Cordia New"/>
+        <a:font script="Ethi" typeface="Nyala"/>
+        <a:font script="Beng" typeface="Vrinda"/>
+        <a:font script="Gujr" typeface="Shruti"/>
+        <a:font script="Khmr" typeface="DaunPenh"/>
+        <a:font script="Knda" typeface="Tunga"/>
+        <a:font script="Guru" typeface="Raavi"/>
+        <a:font script="Cans" typeface="Euphemia"/>
+        <a:font script="Cher" typeface="Plantagenet Cherokee"/>
+        <a:font script="Yiii" typeface="Microsoft Yi Baiti"/>
+        <a:font script="Tibt" typeface="Microsoft Himalaya"/>
+        <a:font script="Thaa" typeface="MV Boli"/>
+        <a:font script="Deva" typeface="Mangal"/>
+        <a:font script="Telu" typeface="Gautami"/>
+        <a:font script="Taml" typeface="Latha"/>
+        <a:font script="Syrc" typeface="Estrangelo Edessa"/>
+        <a:font script="Orya" typeface="Kalinga"/>
+        <a:font script="Mlym" typeface="Kartika"/>
+        <a:font script="Laoo" typeface="DokChampa"/>
+        <a:font script="Sinh" typeface="Iskoola Pota"/>
+        <a:font script="Mong" typeface="Mongolian Baiti"/>
+        <a:font script="Viet" typeface="Arial"/>
+        <a:font script="Uigh" typeface="Microsoft Uighur"/>
+        <a:font script="Geor" typeface="Sylfaen"/>
+        <a:font script="Armn" typeface="Arial"/>
+        <a:font script="Bugi" typeface="Leelawadee UI"/>
+        <a:font script="Bopo" typeface="Microsoft JhengHei"/>
+        <a:font script="Java" typeface="Javanese Text"/>
+        <a:font script="Lisu" typeface="Segoe UI"/>
+        <a:font script="Mymr" typeface="Myanmar Text"/>
+        <a:font script="Nkoo" typeface="Ebrima"/>
+        <a:font script="Olck" typeface="Nirmala UI"/>
+        <a:font script="Osma" typeface="Ebrima"/>
+        <a:font script="Phag" typeface="Phagspa"/>
+        <a:font script="Syrn" typeface="Estrangelo Edessa"/>
+        <a:font script="Syrj" typeface="Estrangelo Edessa"/>
+        <a:font script="Syre" typeface="Estrangelo Edessa"/>
+        <a:font script="Sora" typeface="Nirmala UI"/>
+        <a:font script="Tale" typeface="Microsoft Tai Le"/>
+        <a:font script="Talu" typeface="Microsoft New Tai Lue"/>
+        <a:font script="Tfng" typeface="Ebrima"/>
+      </a:minorFont>
+    </a:fontScheme>
+    <a:fmtScheme name="Office">
+      <a:fillStyleLst>
+        <a:solidFill>
+          <a:schemeClr val="phClr"/>
+        </a:solidFill>
+        <a:gradFill rotWithShape="1">
+          <a:gsLst>
+            <a:gs pos="0">
+              <a:schemeClr val="phClr">
+                <a:lumMod val="110000"/>
+                <a:satMod val="105000"/>
+                <a:tint val="67000"/>
+              </a:schemeClr>
+            </a:gs>
+            <a:gs pos="50000">
+              <a:schemeClr val="phClr">
+                <a:lumMod val="105000"/>
+                <a:satMod val="103000"/>
+                <a:tint val="73000"/>
+              </a:schemeClr>
+            </a:gs>
+            <a:gs pos="100000">
+              <a:schemeClr val="phClr">
+                <a:lumMod val="105000"/>
+                <a:satMod val="109000"/>
+                <a:tint val="81000"/>
+              </a:schemeClr>
+            </a:gs>
+          </a:gsLst>
+          <a:lin ang="5400000" scaled="0"/>
+        </a:gradFill>
+        <a:gradFill rotWithShape="1">
+          <a:gsLst>
+            <a:gs pos="0">
+              <a:schemeClr val="phClr">
+                <a:satMod val="103000"/>
+                <a:lumMod val="102000"/>
+                <a:tint val="94000"/>
+              </a:schemeClr>
+            </a:gs>
+            <a:gs pos="50000">
+              <a:schemeClr val="phClr">
+                <a:satMod val="110000"/>
+                <a:lumMod val="100000"/>
+                <a:shade val="100000"/>
+              </a:schemeClr>
+            </a:gs>
+            <a:gs pos="100000">
+              <a:schemeClr val="phClr">
+                <a:lumMod val="99000"/>
+                <a:satMod val="120000"/>
+                <a:shade val="78000"/>
+              </a:schemeClr>
+            </a:gs>
+          </a:gsLst>
+          <a:lin ang="5400000" scaled="0"/>
+        </a:gradFill>
+      </a:fillStyleLst>
+      <a:lnStyleLst>
+        <a:ln w="6350" cap="flat" cmpd="sng" algn="ctr">
+          <a:solidFill>
+            <a:schemeClr val="phClr"/>
+          </a:solidFill>
+          <a:prstDash val="solid"/>
+          <a:miter lim="800000"/>
+        </a:ln>
+        <a:ln w="12700" cap="flat" cmpd="sng" algn="ctr">
+          <a:solidFill>
+            <a:schemeClr val="phClr"/>
+          </a:solidFill>
+          <a:prstDash val="solid"/>
+          <a:miter lim="800000"/>
+        </a:ln>
+        <a:ln w="19050" cap="flat" cmpd="sng" algn="ctr">
+          <a:solidFill>
+            <a:schemeClr val="phClr"/>
+          </a:solidFill>
+          <a:prstDash val="solid"/>
+          <a:miter lim="800000"/>
+        </a:ln>
+      </a:lnStyleLst>
+      <a:effectStyleLst>
+        <a:effectStyle>
+          <a:effectLst/>
+        </a:effectStyle>
+        <a:effectStyle>
+          <a:effectLst/>
+        </a:effectStyle>
+        <a:effectStyle>
+          <a:effectLst>
+            <a:outerShdw blurRad="57150" dist="19050" dir="5400000" algn="ctr" rotWithShape="0">
+              <a:srgbClr val="000000">
+                <a:alpha val="63000"/>
+              </a:srgbClr>
+            </a:outerShdw>
+          </a:effectLst>
+        </a:effectStyle>
+      </a:effectStyleLst>
+      <a:bgFillStyleLst>
+        <a:solidFill>
+          <a:schemeClr val="phClr"/>
+        </a:solidFill>
+        <a:solidFill>
+          <a:schemeClr val="phClr">
+            <a:tint val="95000"/>
+            <a:satMod val="170000"/>
+          </a:schemeClr>
+        </a:solidFill>
+        <a:gradFill rotWithShape="1">
+          <a:gsLst>
+            <a:gs pos="0">
+              <a:schemeClr val="phClr">
+                <a:tint val="93000"/>
+                <a:satMod val="150000"/>
+                <a:shade val="98000"/>
+                <a:lumMod val="102000"/>
+              </a:schemeClr>
+            </a:gs>
+            <a:gs pos="50000">
+              <a:schemeClr val="phClr">
+                <a:tint val="98000"/>
+                <a:satMod val="130000"/>
+                <a:shade val="90000"/>
+                <a:lumMod val="103000"/>
+              </a:schemeClr>
+            </a:gs>
+            <a:gs pos="100000">
+              <a:schemeClr val="phClr">
+                <a:shade val="63000"/>
+                <a:satMod val="120000"/>
+              </a:schemeClr>
+            </a:gs>
+          </a:gsLst>
+          <a:lin ang="5400000" scaled="0"/>
+        </a:gradFill>
+      </a:bgFillStyleLst>
+    </a:fmtScheme>
+  </a:themeElements>
+  <a:objectDefaults/>
+  <a:extraClrSchemeLst/>
+  <a:extLst>
+    <a:ext uri="{05A4C25C-085E-4340-85A3-A5531E510DB2}">
+      <thm15:themeFamily xmlns:thm15="http://schemas.microsoft.com/office/thememl/2012/main" name="Office Theme" id="{62F939B6-93AF-4DB8-9C6B-D6C7DFDC589F}" vid="{4A3C46E8-61CC-4603-A589-7422A47A8E4A}"/>
+    </a:ext>
+  </a:extLst>
+</a:theme>
 </file>
</xml_diff>